<commit_message>
pptx for quick drawing of figures
</commit_message>
<xml_diff>
--- a/materials/lectures/3_Wednesday/Paul.Pyl.VariantCalling.and.QC/Figures.pptx
+++ b/materials/lectures/3_Wednesday/Paul.Pyl.VariantCalling.and.QC/Figures.pptx
@@ -10,7 +10,6 @@
     <p:sldId id="259" r:id="rId4"/>
     <p:sldId id="260" r:id="rId5"/>
     <p:sldId id="261" r:id="rId6"/>
-    <p:sldId id="262" r:id="rId7"/>
   </p:sldIdLst>
   <p:sldSz cx="9144000" cy="6858000" type="screen4x3"/>
   <p:notesSz cx="6858000" cy="9144000"/>
@@ -293,7 +292,7 @@
           <a:p>
             <a:fld id="{8C573C28-512F-4147-8D1E-BDD9DAED593A}" type="datetimeFigureOut">
               <a:rPr lang="en-US" smtClean="0"/>
-              <a:t>12/06/15</a:t>
+              <a:t>16/06/15</a:t>
             </a:fld>
             <a:endParaRPr lang="en-US"/>
           </a:p>
@@ -463,7 +462,7 @@
           <a:p>
             <a:fld id="{8C573C28-512F-4147-8D1E-BDD9DAED593A}" type="datetimeFigureOut">
               <a:rPr lang="en-US" smtClean="0"/>
-              <a:t>12/06/15</a:t>
+              <a:t>16/06/15</a:t>
             </a:fld>
             <a:endParaRPr lang="en-US"/>
           </a:p>
@@ -643,7 +642,7 @@
           <a:p>
             <a:fld id="{8C573C28-512F-4147-8D1E-BDD9DAED593A}" type="datetimeFigureOut">
               <a:rPr lang="en-US" smtClean="0"/>
-              <a:t>12/06/15</a:t>
+              <a:t>16/06/15</a:t>
             </a:fld>
             <a:endParaRPr lang="en-US"/>
           </a:p>
@@ -813,7 +812,7 @@
           <a:p>
             <a:fld id="{8C573C28-512F-4147-8D1E-BDD9DAED593A}" type="datetimeFigureOut">
               <a:rPr lang="en-US" smtClean="0"/>
-              <a:t>12/06/15</a:t>
+              <a:t>16/06/15</a:t>
             </a:fld>
             <a:endParaRPr lang="en-US"/>
           </a:p>
@@ -1059,7 +1058,7 @@
           <a:p>
             <a:fld id="{8C573C28-512F-4147-8D1E-BDD9DAED593A}" type="datetimeFigureOut">
               <a:rPr lang="en-US" smtClean="0"/>
-              <a:t>12/06/15</a:t>
+              <a:t>16/06/15</a:t>
             </a:fld>
             <a:endParaRPr lang="en-US"/>
           </a:p>
@@ -1347,7 +1346,7 @@
           <a:p>
             <a:fld id="{8C573C28-512F-4147-8D1E-BDD9DAED593A}" type="datetimeFigureOut">
               <a:rPr lang="en-US" smtClean="0"/>
-              <a:t>12/06/15</a:t>
+              <a:t>16/06/15</a:t>
             </a:fld>
             <a:endParaRPr lang="en-US"/>
           </a:p>
@@ -1769,7 +1768,7 @@
           <a:p>
             <a:fld id="{8C573C28-512F-4147-8D1E-BDD9DAED593A}" type="datetimeFigureOut">
               <a:rPr lang="en-US" smtClean="0"/>
-              <a:t>12/06/15</a:t>
+              <a:t>16/06/15</a:t>
             </a:fld>
             <a:endParaRPr lang="en-US"/>
           </a:p>
@@ -1887,7 +1886,7 @@
           <a:p>
             <a:fld id="{8C573C28-512F-4147-8D1E-BDD9DAED593A}" type="datetimeFigureOut">
               <a:rPr lang="en-US" smtClean="0"/>
-              <a:t>12/06/15</a:t>
+              <a:t>16/06/15</a:t>
             </a:fld>
             <a:endParaRPr lang="en-US"/>
           </a:p>
@@ -1982,7 +1981,7 @@
           <a:p>
             <a:fld id="{8C573C28-512F-4147-8D1E-BDD9DAED593A}" type="datetimeFigureOut">
               <a:rPr lang="en-US" smtClean="0"/>
-              <a:t>12/06/15</a:t>
+              <a:t>16/06/15</a:t>
             </a:fld>
             <a:endParaRPr lang="en-US"/>
           </a:p>
@@ -2259,7 +2258,7 @@
           <a:p>
             <a:fld id="{8C573C28-512F-4147-8D1E-BDD9DAED593A}" type="datetimeFigureOut">
               <a:rPr lang="en-US" smtClean="0"/>
-              <a:t>12/06/15</a:t>
+              <a:t>16/06/15</a:t>
             </a:fld>
             <a:endParaRPr lang="en-US"/>
           </a:p>
@@ -2512,7 +2511,7 @@
           <a:p>
             <a:fld id="{8C573C28-512F-4147-8D1E-BDD9DAED593A}" type="datetimeFigureOut">
               <a:rPr lang="en-US" smtClean="0"/>
-              <a:t>12/06/15</a:t>
+              <a:t>16/06/15</a:t>
             </a:fld>
             <a:endParaRPr lang="en-US"/>
           </a:p>
@@ -2725,7 +2724,7 @@
           <a:p>
             <a:fld id="{8C573C28-512F-4147-8D1E-BDD9DAED593A}" type="datetimeFigureOut">
               <a:rPr lang="en-US" smtClean="0"/>
-              <a:t>12/06/15</a:t>
+              <a:t>16/06/15</a:t>
             </a:fld>
             <a:endParaRPr lang="en-US"/>
           </a:p>
@@ -3812,7 +3811,6 @@
                 <a:rPr lang="en-US" dirty="0"/>
                 <a:t>G</a:t>
               </a:r>
-              <a:endParaRPr lang="en-US" dirty="0"/>
             </a:p>
           </p:txBody>
         </p:sp>
@@ -7204,7 +7202,6 @@
                 <a:rPr lang="en-US" dirty="0"/>
                 <a:t>G</a:t>
               </a:r>
-              <a:endParaRPr lang="en-US" dirty="0"/>
             </a:p>
           </p:txBody>
         </p:sp>
@@ -11696,6 +11693,88 @@
           </a:fontRef>
         </p:style>
       </p:cxnSp>
+      <p:sp>
+        <p:nvSpPr>
+          <p:cNvPr id="15" name="Rectangle 14"/>
+          <p:cNvSpPr/>
+          <p:nvPr/>
+        </p:nvSpPr>
+        <p:spPr>
+          <a:xfrm>
+            <a:off x="4210245" y="2567055"/>
+            <a:ext cx="1292884" cy="518873"/>
+          </a:xfrm>
+          <a:prstGeom prst="rect">
+            <a:avLst/>
+          </a:prstGeom>
+        </p:spPr>
+        <p:style>
+          <a:lnRef idx="2">
+            <a:schemeClr val="accent3"/>
+          </a:lnRef>
+          <a:fillRef idx="1">
+            <a:schemeClr val="lt1"/>
+          </a:fillRef>
+          <a:effectRef idx="0">
+            <a:schemeClr val="accent3"/>
+          </a:effectRef>
+          <a:fontRef idx="minor">
+            <a:schemeClr val="dk1"/>
+          </a:fontRef>
+        </p:style>
+        <p:txBody>
+          <a:bodyPr rtlCol="0" anchor="ctr"/>
+          <a:lstStyle/>
+          <a:p>
+            <a:pPr algn="ctr"/>
+            <a:r>
+              <a:rPr lang="en-US" dirty="0" smtClean="0"/>
+              <a:t>Abundance Estimates</a:t>
+            </a:r>
+            <a:endParaRPr lang="en-US" dirty="0"/>
+          </a:p>
+        </p:txBody>
+      </p:sp>
+      <p:cxnSp>
+        <p:nvCxnSpPr>
+          <p:cNvPr id="17" name="Straight Arrow Connector 16"/>
+          <p:cNvCxnSpPr>
+            <a:stCxn id="11" idx="3"/>
+            <a:endCxn id="15" idx="1"/>
+          </p:cNvCxnSpPr>
+          <p:nvPr/>
+        </p:nvCxnSpPr>
+        <p:spPr>
+          <a:xfrm>
+            <a:off x="3775463" y="2826492"/>
+            <a:ext cx="434782" cy="0"/>
+          </a:xfrm>
+          <a:prstGeom prst="straightConnector1">
+            <a:avLst/>
+          </a:prstGeom>
+          <a:ln>
+            <a:solidFill>
+              <a:srgbClr val="000000"/>
+            </a:solidFill>
+            <a:tailEnd type="arrow"/>
+          </a:ln>
+          <a:effectLst/>
+        </p:spPr>
+        <p:style>
+          <a:lnRef idx="2">
+            <a:schemeClr val="accent1"/>
+          </a:lnRef>
+          <a:fillRef idx="0">
+            <a:schemeClr val="accent1"/>
+          </a:fillRef>
+          <a:effectRef idx="1">
+            <a:schemeClr val="accent1"/>
+          </a:effectRef>
+          <a:fontRef idx="minor">
+            <a:schemeClr val="tx1"/>
+          </a:fontRef>
+        </p:style>
+      </p:cxnSp>
     </p:spTree>
     <p:extLst>
       <p:ext uri="{BB962C8B-B14F-4D97-AF65-F5344CB8AC3E}">
@@ -11759,36 +11838,6 @@
     <p:extLst>
       <p:ext uri="{BB962C8B-B14F-4D97-AF65-F5344CB8AC3E}">
         <p14:creationId xmlns:p14="http://schemas.microsoft.com/office/powerpoint/2010/main" val="2873674659"/>
-      </p:ext>
-    </p:extLst>
-  </p:cSld>
-  <p:clrMapOvr>
-    <a:masterClrMapping/>
-  </p:clrMapOvr>
-</p:sld>
-</file>
-
-<file path=ppt/slides/slide6.xml><?xml version="1.0" encoding="utf-8"?>
-<p:sld xmlns:a="http://schemas.openxmlformats.org/drawingml/2006/main" xmlns:r="http://schemas.openxmlformats.org/officeDocument/2006/relationships" xmlns:p="http://schemas.openxmlformats.org/presentationml/2006/main">
-  <p:cSld>
-    <p:spTree>
-      <p:nvGrpSpPr>
-        <p:cNvPr id="1" name=""/>
-        <p:cNvGrpSpPr/>
-        <p:nvPr/>
-      </p:nvGrpSpPr>
-      <p:grpSpPr>
-        <a:xfrm>
-          <a:off x="0" y="0"/>
-          <a:ext cx="0" cy="0"/>
-          <a:chOff x="0" y="0"/>
-          <a:chExt cx="0" cy="0"/>
-        </a:xfrm>
-      </p:grpSpPr>
-    </p:spTree>
-    <p:extLst>
-      <p:ext uri="{BB962C8B-B14F-4D97-AF65-F5344CB8AC3E}">
-        <p14:creationId xmlns:p14="http://schemas.microsoft.com/office/powerpoint/2010/main" val="2413148706"/>
       </p:ext>
     </p:extLst>
   </p:cSld>

</xml_diff>

<commit_message>
Ignoring pptx file and html output
</commit_message>
<xml_diff>
--- a/materials/lectures/3_Wednesday/Paul.Pyl.VariantCalling.and.QC/Figures.pptx
+++ b/materials/lectures/3_Wednesday/Paul.Pyl.VariantCalling.and.QC/Figures.pptx
@@ -10,7 +10,8 @@
     <p:sldId id="259" r:id="rId4"/>
     <p:sldId id="260" r:id="rId5"/>
     <p:sldId id="262" r:id="rId6"/>
-    <p:sldId id="261" r:id="rId7"/>
+    <p:sldId id="263" r:id="rId7"/>
+    <p:sldId id="261" r:id="rId8"/>
   </p:sldIdLst>
   <p:sldSz cx="9144000" cy="6858000" type="screen4x3"/>
   <p:notesSz cx="6858000" cy="9144000"/>
@@ -13787,6 +13788,2778 @@
           <a:chExt cx="0" cy="0"/>
         </a:xfrm>
       </p:grpSpPr>
+      <p:grpSp>
+        <p:nvGrpSpPr>
+          <p:cNvPr id="4" name="Group 3"/>
+          <p:cNvGrpSpPr/>
+          <p:nvPr/>
+        </p:nvGrpSpPr>
+        <p:grpSpPr>
+          <a:xfrm>
+            <a:off x="1478199" y="1306565"/>
+            <a:ext cx="1324575" cy="136546"/>
+            <a:chOff x="2075621" y="2223686"/>
+            <a:chExt cx="1324575" cy="136546"/>
+          </a:xfrm>
+        </p:grpSpPr>
+        <p:cxnSp>
+          <p:nvCxnSpPr>
+            <p:cNvPr id="5" name="Straight Arrow Connector 4"/>
+            <p:cNvCxnSpPr/>
+            <p:nvPr/>
+          </p:nvCxnSpPr>
+          <p:spPr>
+            <a:xfrm>
+              <a:off x="2075621" y="2360232"/>
+              <a:ext cx="832980" cy="0"/>
+            </a:xfrm>
+            <a:prstGeom prst="straightConnector1">
+              <a:avLst/>
+            </a:prstGeom>
+            <a:ln>
+              <a:solidFill>
+                <a:schemeClr val="accent6">
+                  <a:lumMod val="75000"/>
+                </a:schemeClr>
+              </a:solidFill>
+              <a:tailEnd type="arrow"/>
+            </a:ln>
+            <a:effectLst/>
+          </p:spPr>
+          <p:style>
+            <a:lnRef idx="2">
+              <a:schemeClr val="accent1"/>
+            </a:lnRef>
+            <a:fillRef idx="0">
+              <a:schemeClr val="accent1"/>
+            </a:fillRef>
+            <a:effectRef idx="1">
+              <a:schemeClr val="accent1"/>
+            </a:effectRef>
+            <a:fontRef idx="minor">
+              <a:schemeClr val="tx1"/>
+            </a:fontRef>
+          </p:style>
+        </p:cxnSp>
+        <p:cxnSp>
+          <p:nvCxnSpPr>
+            <p:cNvPr id="6" name="Straight Arrow Connector 5"/>
+            <p:cNvCxnSpPr/>
+            <p:nvPr/>
+          </p:nvCxnSpPr>
+          <p:spPr>
+            <a:xfrm flipH="1">
+              <a:off x="2621837" y="2223686"/>
+              <a:ext cx="778359" cy="0"/>
+            </a:xfrm>
+            <a:prstGeom prst="straightConnector1">
+              <a:avLst/>
+            </a:prstGeom>
+            <a:ln>
+              <a:solidFill>
+                <a:schemeClr val="accent6">
+                  <a:lumMod val="75000"/>
+                </a:schemeClr>
+              </a:solidFill>
+              <a:tailEnd type="arrow"/>
+            </a:ln>
+            <a:effectLst/>
+          </p:spPr>
+          <p:style>
+            <a:lnRef idx="2">
+              <a:schemeClr val="accent1"/>
+            </a:lnRef>
+            <a:fillRef idx="0">
+              <a:schemeClr val="accent1"/>
+            </a:fillRef>
+            <a:effectRef idx="1">
+              <a:schemeClr val="accent1"/>
+            </a:effectRef>
+            <a:fontRef idx="minor">
+              <a:schemeClr val="tx1"/>
+            </a:fontRef>
+          </p:style>
+        </p:cxnSp>
+      </p:grpSp>
+      <p:grpSp>
+        <p:nvGrpSpPr>
+          <p:cNvPr id="7" name="Group 6"/>
+          <p:cNvGrpSpPr/>
+          <p:nvPr/>
+        </p:nvGrpSpPr>
+        <p:grpSpPr>
+          <a:xfrm>
+            <a:off x="1630599" y="1592508"/>
+            <a:ext cx="1324575" cy="136546"/>
+            <a:chOff x="2075621" y="2223686"/>
+            <a:chExt cx="1324575" cy="136546"/>
+          </a:xfrm>
+        </p:grpSpPr>
+        <p:cxnSp>
+          <p:nvCxnSpPr>
+            <p:cNvPr id="8" name="Straight Arrow Connector 7"/>
+            <p:cNvCxnSpPr/>
+            <p:nvPr/>
+          </p:nvCxnSpPr>
+          <p:spPr>
+            <a:xfrm>
+              <a:off x="2075621" y="2360232"/>
+              <a:ext cx="832980" cy="0"/>
+            </a:xfrm>
+            <a:prstGeom prst="straightConnector1">
+              <a:avLst/>
+            </a:prstGeom>
+            <a:ln>
+              <a:solidFill>
+                <a:schemeClr val="accent6">
+                  <a:lumMod val="75000"/>
+                </a:schemeClr>
+              </a:solidFill>
+              <a:tailEnd type="arrow"/>
+            </a:ln>
+            <a:effectLst/>
+          </p:spPr>
+          <p:style>
+            <a:lnRef idx="2">
+              <a:schemeClr val="accent1"/>
+            </a:lnRef>
+            <a:fillRef idx="0">
+              <a:schemeClr val="accent1"/>
+            </a:fillRef>
+            <a:effectRef idx="1">
+              <a:schemeClr val="accent1"/>
+            </a:effectRef>
+            <a:fontRef idx="minor">
+              <a:schemeClr val="tx1"/>
+            </a:fontRef>
+          </p:style>
+        </p:cxnSp>
+        <p:cxnSp>
+          <p:nvCxnSpPr>
+            <p:cNvPr id="9" name="Straight Arrow Connector 8"/>
+            <p:cNvCxnSpPr/>
+            <p:nvPr/>
+          </p:nvCxnSpPr>
+          <p:spPr>
+            <a:xfrm flipH="1">
+              <a:off x="2621837" y="2223686"/>
+              <a:ext cx="778359" cy="0"/>
+            </a:xfrm>
+            <a:prstGeom prst="straightConnector1">
+              <a:avLst/>
+            </a:prstGeom>
+            <a:ln>
+              <a:solidFill>
+                <a:schemeClr val="accent6">
+                  <a:lumMod val="75000"/>
+                </a:schemeClr>
+              </a:solidFill>
+              <a:tailEnd type="arrow"/>
+            </a:ln>
+            <a:effectLst/>
+          </p:spPr>
+          <p:style>
+            <a:lnRef idx="2">
+              <a:schemeClr val="accent1"/>
+            </a:lnRef>
+            <a:fillRef idx="0">
+              <a:schemeClr val="accent1"/>
+            </a:fillRef>
+            <a:effectRef idx="1">
+              <a:schemeClr val="accent1"/>
+            </a:effectRef>
+            <a:fontRef idx="minor">
+              <a:schemeClr val="tx1"/>
+            </a:fontRef>
+          </p:style>
+        </p:cxnSp>
+      </p:grpSp>
+      <p:grpSp>
+        <p:nvGrpSpPr>
+          <p:cNvPr id="10" name="Group 9"/>
+          <p:cNvGrpSpPr/>
+          <p:nvPr/>
+        </p:nvGrpSpPr>
+        <p:grpSpPr>
+          <a:xfrm>
+            <a:off x="3389955" y="1592508"/>
+            <a:ext cx="1324575" cy="136546"/>
+            <a:chOff x="2075621" y="2223686"/>
+            <a:chExt cx="1324575" cy="136546"/>
+          </a:xfrm>
+        </p:grpSpPr>
+        <p:cxnSp>
+          <p:nvCxnSpPr>
+            <p:cNvPr id="11" name="Straight Arrow Connector 10"/>
+            <p:cNvCxnSpPr/>
+            <p:nvPr/>
+          </p:nvCxnSpPr>
+          <p:spPr>
+            <a:xfrm>
+              <a:off x="2075621" y="2360232"/>
+              <a:ext cx="832980" cy="0"/>
+            </a:xfrm>
+            <a:prstGeom prst="straightConnector1">
+              <a:avLst/>
+            </a:prstGeom>
+            <a:ln>
+              <a:solidFill>
+                <a:schemeClr val="accent3">
+                  <a:lumMod val="75000"/>
+                </a:schemeClr>
+              </a:solidFill>
+              <a:tailEnd type="arrow"/>
+            </a:ln>
+            <a:effectLst/>
+          </p:spPr>
+          <p:style>
+            <a:lnRef idx="2">
+              <a:schemeClr val="accent1"/>
+            </a:lnRef>
+            <a:fillRef idx="0">
+              <a:schemeClr val="accent1"/>
+            </a:fillRef>
+            <a:effectRef idx="1">
+              <a:schemeClr val="accent1"/>
+            </a:effectRef>
+            <a:fontRef idx="minor">
+              <a:schemeClr val="tx1"/>
+            </a:fontRef>
+          </p:style>
+        </p:cxnSp>
+        <p:cxnSp>
+          <p:nvCxnSpPr>
+            <p:cNvPr id="12" name="Straight Arrow Connector 11"/>
+            <p:cNvCxnSpPr/>
+            <p:nvPr/>
+          </p:nvCxnSpPr>
+          <p:spPr>
+            <a:xfrm flipH="1">
+              <a:off x="2621837" y="2223686"/>
+              <a:ext cx="778359" cy="0"/>
+            </a:xfrm>
+            <a:prstGeom prst="straightConnector1">
+              <a:avLst/>
+            </a:prstGeom>
+            <a:ln>
+              <a:solidFill>
+                <a:schemeClr val="accent3">
+                  <a:lumMod val="75000"/>
+                </a:schemeClr>
+              </a:solidFill>
+              <a:tailEnd type="arrow"/>
+            </a:ln>
+            <a:effectLst/>
+          </p:spPr>
+          <p:style>
+            <a:lnRef idx="2">
+              <a:schemeClr val="accent1"/>
+            </a:lnRef>
+            <a:fillRef idx="0">
+              <a:schemeClr val="accent1"/>
+            </a:fillRef>
+            <a:effectRef idx="1">
+              <a:schemeClr val="accent1"/>
+            </a:effectRef>
+            <a:fontRef idx="minor">
+              <a:schemeClr val="tx1"/>
+            </a:fontRef>
+          </p:style>
+        </p:cxnSp>
+      </p:grpSp>
+      <p:grpSp>
+        <p:nvGrpSpPr>
+          <p:cNvPr id="13" name="Group 12"/>
+          <p:cNvGrpSpPr/>
+          <p:nvPr/>
+        </p:nvGrpSpPr>
+        <p:grpSpPr>
+          <a:xfrm>
+            <a:off x="3546993" y="1306565"/>
+            <a:ext cx="1324575" cy="136546"/>
+            <a:chOff x="2075621" y="2223686"/>
+            <a:chExt cx="1324575" cy="136546"/>
+          </a:xfrm>
+        </p:grpSpPr>
+        <p:cxnSp>
+          <p:nvCxnSpPr>
+            <p:cNvPr id="14" name="Straight Arrow Connector 13"/>
+            <p:cNvCxnSpPr/>
+            <p:nvPr/>
+          </p:nvCxnSpPr>
+          <p:spPr>
+            <a:xfrm>
+              <a:off x="2075621" y="2360232"/>
+              <a:ext cx="832980" cy="0"/>
+            </a:xfrm>
+            <a:prstGeom prst="straightConnector1">
+              <a:avLst/>
+            </a:prstGeom>
+            <a:ln>
+              <a:solidFill>
+                <a:schemeClr val="accent3">
+                  <a:lumMod val="75000"/>
+                </a:schemeClr>
+              </a:solidFill>
+              <a:tailEnd type="arrow"/>
+            </a:ln>
+            <a:effectLst/>
+          </p:spPr>
+          <p:style>
+            <a:lnRef idx="2">
+              <a:schemeClr val="accent1"/>
+            </a:lnRef>
+            <a:fillRef idx="0">
+              <a:schemeClr val="accent1"/>
+            </a:fillRef>
+            <a:effectRef idx="1">
+              <a:schemeClr val="accent1"/>
+            </a:effectRef>
+            <a:fontRef idx="minor">
+              <a:schemeClr val="tx1"/>
+            </a:fontRef>
+          </p:style>
+        </p:cxnSp>
+        <p:cxnSp>
+          <p:nvCxnSpPr>
+            <p:cNvPr id="15" name="Straight Arrow Connector 14"/>
+            <p:cNvCxnSpPr/>
+            <p:nvPr/>
+          </p:nvCxnSpPr>
+          <p:spPr>
+            <a:xfrm flipH="1">
+              <a:off x="2621837" y="2223686"/>
+              <a:ext cx="778359" cy="0"/>
+            </a:xfrm>
+            <a:prstGeom prst="straightConnector1">
+              <a:avLst/>
+            </a:prstGeom>
+            <a:ln>
+              <a:solidFill>
+                <a:schemeClr val="accent3">
+                  <a:lumMod val="75000"/>
+                </a:schemeClr>
+              </a:solidFill>
+              <a:tailEnd type="arrow"/>
+            </a:ln>
+            <a:effectLst/>
+          </p:spPr>
+          <p:style>
+            <a:lnRef idx="2">
+              <a:schemeClr val="accent1"/>
+            </a:lnRef>
+            <a:fillRef idx="0">
+              <a:schemeClr val="accent1"/>
+            </a:fillRef>
+            <a:effectRef idx="1">
+              <a:schemeClr val="accent1"/>
+            </a:effectRef>
+            <a:fontRef idx="minor">
+              <a:schemeClr val="tx1"/>
+            </a:fontRef>
+          </p:style>
+        </p:cxnSp>
+      </p:grpSp>
+      <p:grpSp>
+        <p:nvGrpSpPr>
+          <p:cNvPr id="19" name="Group 18"/>
+          <p:cNvGrpSpPr/>
+          <p:nvPr/>
+        </p:nvGrpSpPr>
+        <p:grpSpPr>
+          <a:xfrm>
+            <a:off x="1532819" y="3805101"/>
+            <a:ext cx="1324575" cy="136546"/>
+            <a:chOff x="2075621" y="2223686"/>
+            <a:chExt cx="1324575" cy="136546"/>
+          </a:xfrm>
+        </p:grpSpPr>
+        <p:cxnSp>
+          <p:nvCxnSpPr>
+            <p:cNvPr id="20" name="Straight Arrow Connector 19"/>
+            <p:cNvCxnSpPr/>
+            <p:nvPr/>
+          </p:nvCxnSpPr>
+          <p:spPr>
+            <a:xfrm>
+              <a:off x="2075621" y="2360232"/>
+              <a:ext cx="832980" cy="0"/>
+            </a:xfrm>
+            <a:prstGeom prst="straightConnector1">
+              <a:avLst/>
+            </a:prstGeom>
+            <a:ln>
+              <a:solidFill>
+                <a:schemeClr val="accent1">
+                  <a:lumMod val="60000"/>
+                  <a:lumOff val="40000"/>
+                </a:schemeClr>
+              </a:solidFill>
+              <a:tailEnd type="arrow"/>
+            </a:ln>
+            <a:effectLst/>
+          </p:spPr>
+          <p:style>
+            <a:lnRef idx="2">
+              <a:schemeClr val="accent1"/>
+            </a:lnRef>
+            <a:fillRef idx="0">
+              <a:schemeClr val="accent1"/>
+            </a:fillRef>
+            <a:effectRef idx="1">
+              <a:schemeClr val="accent1"/>
+            </a:effectRef>
+            <a:fontRef idx="minor">
+              <a:schemeClr val="tx1"/>
+            </a:fontRef>
+          </p:style>
+        </p:cxnSp>
+        <p:cxnSp>
+          <p:nvCxnSpPr>
+            <p:cNvPr id="21" name="Straight Arrow Connector 20"/>
+            <p:cNvCxnSpPr/>
+            <p:nvPr/>
+          </p:nvCxnSpPr>
+          <p:spPr>
+            <a:xfrm flipH="1">
+              <a:off x="2621837" y="2223686"/>
+              <a:ext cx="778359" cy="0"/>
+            </a:xfrm>
+            <a:prstGeom prst="straightConnector1">
+              <a:avLst/>
+            </a:prstGeom>
+            <a:ln>
+              <a:solidFill>
+                <a:schemeClr val="accent1">
+                  <a:lumMod val="60000"/>
+                  <a:lumOff val="40000"/>
+                </a:schemeClr>
+              </a:solidFill>
+              <a:tailEnd type="arrow"/>
+            </a:ln>
+            <a:effectLst/>
+          </p:spPr>
+          <p:style>
+            <a:lnRef idx="2">
+              <a:schemeClr val="accent1"/>
+            </a:lnRef>
+            <a:fillRef idx="0">
+              <a:schemeClr val="accent1"/>
+            </a:fillRef>
+            <a:effectRef idx="1">
+              <a:schemeClr val="accent1"/>
+            </a:effectRef>
+            <a:fontRef idx="minor">
+              <a:schemeClr val="tx1"/>
+            </a:fontRef>
+          </p:style>
+        </p:cxnSp>
+      </p:grpSp>
+      <p:grpSp>
+        <p:nvGrpSpPr>
+          <p:cNvPr id="28" name="Group 27"/>
+          <p:cNvGrpSpPr/>
+          <p:nvPr/>
+        </p:nvGrpSpPr>
+        <p:grpSpPr>
+          <a:xfrm>
+            <a:off x="1648891" y="3006558"/>
+            <a:ext cx="1324575" cy="136546"/>
+            <a:chOff x="2075621" y="2223686"/>
+            <a:chExt cx="1324575" cy="136546"/>
+          </a:xfrm>
+        </p:grpSpPr>
+        <p:cxnSp>
+          <p:nvCxnSpPr>
+            <p:cNvPr id="29" name="Straight Arrow Connector 28"/>
+            <p:cNvCxnSpPr/>
+            <p:nvPr/>
+          </p:nvCxnSpPr>
+          <p:spPr>
+            <a:xfrm>
+              <a:off x="2075621" y="2360232"/>
+              <a:ext cx="832980" cy="0"/>
+            </a:xfrm>
+            <a:prstGeom prst="straightConnector1">
+              <a:avLst/>
+            </a:prstGeom>
+            <a:ln>
+              <a:solidFill>
+                <a:schemeClr val="accent1">
+                  <a:lumMod val="60000"/>
+                  <a:lumOff val="40000"/>
+                </a:schemeClr>
+              </a:solidFill>
+              <a:tailEnd type="arrow"/>
+            </a:ln>
+            <a:effectLst/>
+          </p:spPr>
+          <p:style>
+            <a:lnRef idx="2">
+              <a:schemeClr val="accent1"/>
+            </a:lnRef>
+            <a:fillRef idx="0">
+              <a:schemeClr val="accent1"/>
+            </a:fillRef>
+            <a:effectRef idx="1">
+              <a:schemeClr val="accent1"/>
+            </a:effectRef>
+            <a:fontRef idx="minor">
+              <a:schemeClr val="tx1"/>
+            </a:fontRef>
+          </p:style>
+        </p:cxnSp>
+        <p:cxnSp>
+          <p:nvCxnSpPr>
+            <p:cNvPr id="30" name="Straight Arrow Connector 29"/>
+            <p:cNvCxnSpPr/>
+            <p:nvPr/>
+          </p:nvCxnSpPr>
+          <p:spPr>
+            <a:xfrm flipH="1">
+              <a:off x="2621837" y="2223686"/>
+              <a:ext cx="778359" cy="0"/>
+            </a:xfrm>
+            <a:prstGeom prst="straightConnector1">
+              <a:avLst/>
+            </a:prstGeom>
+            <a:ln>
+              <a:solidFill>
+                <a:schemeClr val="accent1">
+                  <a:lumMod val="60000"/>
+                  <a:lumOff val="40000"/>
+                </a:schemeClr>
+              </a:solidFill>
+              <a:tailEnd type="arrow"/>
+            </a:ln>
+            <a:effectLst/>
+          </p:spPr>
+          <p:style>
+            <a:lnRef idx="2">
+              <a:schemeClr val="accent1"/>
+            </a:lnRef>
+            <a:fillRef idx="0">
+              <a:schemeClr val="accent1"/>
+            </a:fillRef>
+            <a:effectRef idx="1">
+              <a:schemeClr val="accent1"/>
+            </a:effectRef>
+            <a:fontRef idx="minor">
+              <a:schemeClr val="tx1"/>
+            </a:fontRef>
+          </p:style>
+        </p:cxnSp>
+      </p:grpSp>
+      <p:grpSp>
+        <p:nvGrpSpPr>
+          <p:cNvPr id="31" name="Group 30"/>
+          <p:cNvGrpSpPr/>
+          <p:nvPr/>
+        </p:nvGrpSpPr>
+        <p:grpSpPr>
+          <a:xfrm>
+            <a:off x="1801291" y="3502979"/>
+            <a:ext cx="1324575" cy="136546"/>
+            <a:chOff x="2075621" y="2223686"/>
+            <a:chExt cx="1324575" cy="136546"/>
+          </a:xfrm>
+        </p:grpSpPr>
+        <p:cxnSp>
+          <p:nvCxnSpPr>
+            <p:cNvPr id="32" name="Straight Arrow Connector 31"/>
+            <p:cNvCxnSpPr/>
+            <p:nvPr/>
+          </p:nvCxnSpPr>
+          <p:spPr>
+            <a:xfrm>
+              <a:off x="2075621" y="2360232"/>
+              <a:ext cx="832980" cy="0"/>
+            </a:xfrm>
+            <a:prstGeom prst="straightConnector1">
+              <a:avLst/>
+            </a:prstGeom>
+            <a:ln>
+              <a:solidFill>
+                <a:schemeClr val="accent1">
+                  <a:lumMod val="60000"/>
+                  <a:lumOff val="40000"/>
+                </a:schemeClr>
+              </a:solidFill>
+              <a:tailEnd type="arrow"/>
+            </a:ln>
+            <a:effectLst/>
+          </p:spPr>
+          <p:style>
+            <a:lnRef idx="2">
+              <a:schemeClr val="accent1"/>
+            </a:lnRef>
+            <a:fillRef idx="0">
+              <a:schemeClr val="accent1"/>
+            </a:fillRef>
+            <a:effectRef idx="1">
+              <a:schemeClr val="accent1"/>
+            </a:effectRef>
+            <a:fontRef idx="minor">
+              <a:schemeClr val="tx1"/>
+            </a:fontRef>
+          </p:style>
+        </p:cxnSp>
+        <p:cxnSp>
+          <p:nvCxnSpPr>
+            <p:cNvPr id="33" name="Straight Arrow Connector 32"/>
+            <p:cNvCxnSpPr/>
+            <p:nvPr/>
+          </p:nvCxnSpPr>
+          <p:spPr>
+            <a:xfrm flipH="1">
+              <a:off x="2621837" y="2223686"/>
+              <a:ext cx="778359" cy="0"/>
+            </a:xfrm>
+            <a:prstGeom prst="straightConnector1">
+              <a:avLst/>
+            </a:prstGeom>
+            <a:ln>
+              <a:solidFill>
+                <a:schemeClr val="accent1">
+                  <a:lumMod val="60000"/>
+                  <a:lumOff val="40000"/>
+                </a:schemeClr>
+              </a:solidFill>
+              <a:tailEnd type="arrow"/>
+            </a:ln>
+            <a:effectLst/>
+          </p:spPr>
+          <p:style>
+            <a:lnRef idx="2">
+              <a:schemeClr val="accent1"/>
+            </a:lnRef>
+            <a:fillRef idx="0">
+              <a:schemeClr val="accent1"/>
+            </a:fillRef>
+            <a:effectRef idx="1">
+              <a:schemeClr val="accent1"/>
+            </a:effectRef>
+            <a:fontRef idx="minor">
+              <a:schemeClr val="tx1"/>
+            </a:fontRef>
+          </p:style>
+        </p:cxnSp>
+      </p:grpSp>
+      <p:grpSp>
+        <p:nvGrpSpPr>
+          <p:cNvPr id="34" name="Group 33"/>
+          <p:cNvGrpSpPr/>
+          <p:nvPr/>
+        </p:nvGrpSpPr>
+        <p:grpSpPr>
+          <a:xfrm>
+            <a:off x="1532819" y="3350122"/>
+            <a:ext cx="1324575" cy="136546"/>
+            <a:chOff x="2075621" y="2223686"/>
+            <a:chExt cx="1324575" cy="136546"/>
+          </a:xfrm>
+        </p:grpSpPr>
+        <p:cxnSp>
+          <p:nvCxnSpPr>
+            <p:cNvPr id="35" name="Straight Arrow Connector 34"/>
+            <p:cNvCxnSpPr/>
+            <p:nvPr/>
+          </p:nvCxnSpPr>
+          <p:spPr>
+            <a:xfrm>
+              <a:off x="2075621" y="2360232"/>
+              <a:ext cx="832980" cy="0"/>
+            </a:xfrm>
+            <a:prstGeom prst="straightConnector1">
+              <a:avLst/>
+            </a:prstGeom>
+            <a:ln>
+              <a:solidFill>
+                <a:schemeClr val="accent1">
+                  <a:lumMod val="60000"/>
+                  <a:lumOff val="40000"/>
+                </a:schemeClr>
+              </a:solidFill>
+              <a:tailEnd type="arrow"/>
+            </a:ln>
+            <a:effectLst/>
+          </p:spPr>
+          <p:style>
+            <a:lnRef idx="2">
+              <a:schemeClr val="accent1"/>
+            </a:lnRef>
+            <a:fillRef idx="0">
+              <a:schemeClr val="accent1"/>
+            </a:fillRef>
+            <a:effectRef idx="1">
+              <a:schemeClr val="accent1"/>
+            </a:effectRef>
+            <a:fontRef idx="minor">
+              <a:schemeClr val="tx1"/>
+            </a:fontRef>
+          </p:style>
+        </p:cxnSp>
+        <p:cxnSp>
+          <p:nvCxnSpPr>
+            <p:cNvPr id="36" name="Straight Arrow Connector 35"/>
+            <p:cNvCxnSpPr/>
+            <p:nvPr/>
+          </p:nvCxnSpPr>
+          <p:spPr>
+            <a:xfrm flipH="1">
+              <a:off x="2621837" y="2223686"/>
+              <a:ext cx="778359" cy="0"/>
+            </a:xfrm>
+            <a:prstGeom prst="straightConnector1">
+              <a:avLst/>
+            </a:prstGeom>
+            <a:ln>
+              <a:solidFill>
+                <a:schemeClr val="accent1">
+                  <a:lumMod val="60000"/>
+                  <a:lumOff val="40000"/>
+                </a:schemeClr>
+              </a:solidFill>
+              <a:tailEnd type="arrow"/>
+            </a:ln>
+            <a:effectLst/>
+          </p:spPr>
+          <p:style>
+            <a:lnRef idx="2">
+              <a:schemeClr val="accent1"/>
+            </a:lnRef>
+            <a:fillRef idx="0">
+              <a:schemeClr val="accent1"/>
+            </a:fillRef>
+            <a:effectRef idx="1">
+              <a:schemeClr val="accent1"/>
+            </a:effectRef>
+            <a:fontRef idx="minor">
+              <a:schemeClr val="tx1"/>
+            </a:fontRef>
+          </p:style>
+        </p:cxnSp>
+      </p:grpSp>
+      <p:grpSp>
+        <p:nvGrpSpPr>
+          <p:cNvPr id="37" name="Group 36"/>
+          <p:cNvGrpSpPr/>
+          <p:nvPr/>
+        </p:nvGrpSpPr>
+        <p:grpSpPr>
+          <a:xfrm>
+            <a:off x="1801291" y="2676174"/>
+            <a:ext cx="1324575" cy="136546"/>
+            <a:chOff x="2075621" y="2223686"/>
+            <a:chExt cx="1324575" cy="136546"/>
+          </a:xfrm>
+        </p:grpSpPr>
+        <p:cxnSp>
+          <p:nvCxnSpPr>
+            <p:cNvPr id="38" name="Straight Arrow Connector 37"/>
+            <p:cNvCxnSpPr/>
+            <p:nvPr/>
+          </p:nvCxnSpPr>
+          <p:spPr>
+            <a:xfrm>
+              <a:off x="2075621" y="2360232"/>
+              <a:ext cx="832980" cy="0"/>
+            </a:xfrm>
+            <a:prstGeom prst="straightConnector1">
+              <a:avLst/>
+            </a:prstGeom>
+            <a:ln>
+              <a:solidFill>
+                <a:schemeClr val="accent1">
+                  <a:lumMod val="60000"/>
+                  <a:lumOff val="40000"/>
+                </a:schemeClr>
+              </a:solidFill>
+              <a:tailEnd type="arrow"/>
+            </a:ln>
+            <a:effectLst/>
+          </p:spPr>
+          <p:style>
+            <a:lnRef idx="2">
+              <a:schemeClr val="accent1"/>
+            </a:lnRef>
+            <a:fillRef idx="0">
+              <a:schemeClr val="accent1"/>
+            </a:fillRef>
+            <a:effectRef idx="1">
+              <a:schemeClr val="accent1"/>
+            </a:effectRef>
+            <a:fontRef idx="minor">
+              <a:schemeClr val="tx1"/>
+            </a:fontRef>
+          </p:style>
+        </p:cxnSp>
+        <p:cxnSp>
+          <p:nvCxnSpPr>
+            <p:cNvPr id="39" name="Straight Arrow Connector 38"/>
+            <p:cNvCxnSpPr/>
+            <p:nvPr/>
+          </p:nvCxnSpPr>
+          <p:spPr>
+            <a:xfrm flipH="1">
+              <a:off x="2621837" y="2223686"/>
+              <a:ext cx="778359" cy="0"/>
+            </a:xfrm>
+            <a:prstGeom prst="straightConnector1">
+              <a:avLst/>
+            </a:prstGeom>
+            <a:ln>
+              <a:solidFill>
+                <a:schemeClr val="accent1">
+                  <a:lumMod val="60000"/>
+                  <a:lumOff val="40000"/>
+                </a:schemeClr>
+              </a:solidFill>
+              <a:tailEnd type="arrow"/>
+            </a:ln>
+            <a:effectLst/>
+          </p:spPr>
+          <p:style>
+            <a:lnRef idx="2">
+              <a:schemeClr val="accent1"/>
+            </a:lnRef>
+            <a:fillRef idx="0">
+              <a:schemeClr val="accent1"/>
+            </a:fillRef>
+            <a:effectRef idx="1">
+              <a:schemeClr val="accent1"/>
+            </a:effectRef>
+            <a:fontRef idx="minor">
+              <a:schemeClr val="tx1"/>
+            </a:fontRef>
+          </p:style>
+        </p:cxnSp>
+      </p:grpSp>
+      <p:grpSp>
+        <p:nvGrpSpPr>
+          <p:cNvPr id="40" name="Group 39"/>
+          <p:cNvGrpSpPr/>
+          <p:nvPr/>
+        </p:nvGrpSpPr>
+        <p:grpSpPr>
+          <a:xfrm>
+            <a:off x="1429182" y="2437468"/>
+            <a:ext cx="1324575" cy="136546"/>
+            <a:chOff x="2075621" y="2223686"/>
+            <a:chExt cx="1324575" cy="136546"/>
+          </a:xfrm>
+        </p:grpSpPr>
+        <p:cxnSp>
+          <p:nvCxnSpPr>
+            <p:cNvPr id="41" name="Straight Arrow Connector 40"/>
+            <p:cNvCxnSpPr/>
+            <p:nvPr/>
+          </p:nvCxnSpPr>
+          <p:spPr>
+            <a:xfrm>
+              <a:off x="2075621" y="2360232"/>
+              <a:ext cx="832980" cy="0"/>
+            </a:xfrm>
+            <a:prstGeom prst="straightConnector1">
+              <a:avLst/>
+            </a:prstGeom>
+            <a:ln>
+              <a:solidFill>
+                <a:schemeClr val="accent1">
+                  <a:lumMod val="60000"/>
+                  <a:lumOff val="40000"/>
+                </a:schemeClr>
+              </a:solidFill>
+              <a:tailEnd type="arrow"/>
+            </a:ln>
+            <a:effectLst/>
+          </p:spPr>
+          <p:style>
+            <a:lnRef idx="2">
+              <a:schemeClr val="accent1"/>
+            </a:lnRef>
+            <a:fillRef idx="0">
+              <a:schemeClr val="accent1"/>
+            </a:fillRef>
+            <a:effectRef idx="1">
+              <a:schemeClr val="accent1"/>
+            </a:effectRef>
+            <a:fontRef idx="minor">
+              <a:schemeClr val="tx1"/>
+            </a:fontRef>
+          </p:style>
+        </p:cxnSp>
+        <p:cxnSp>
+          <p:nvCxnSpPr>
+            <p:cNvPr id="42" name="Straight Arrow Connector 41"/>
+            <p:cNvCxnSpPr/>
+            <p:nvPr/>
+          </p:nvCxnSpPr>
+          <p:spPr>
+            <a:xfrm flipH="1">
+              <a:off x="2621837" y="2223686"/>
+              <a:ext cx="778359" cy="0"/>
+            </a:xfrm>
+            <a:prstGeom prst="straightConnector1">
+              <a:avLst/>
+            </a:prstGeom>
+            <a:ln>
+              <a:solidFill>
+                <a:schemeClr val="accent1">
+                  <a:lumMod val="60000"/>
+                  <a:lumOff val="40000"/>
+                </a:schemeClr>
+              </a:solidFill>
+              <a:tailEnd type="arrow"/>
+            </a:ln>
+            <a:effectLst/>
+          </p:spPr>
+          <p:style>
+            <a:lnRef idx="2">
+              <a:schemeClr val="accent1"/>
+            </a:lnRef>
+            <a:fillRef idx="0">
+              <a:schemeClr val="accent1"/>
+            </a:fillRef>
+            <a:effectRef idx="1">
+              <a:schemeClr val="accent1"/>
+            </a:effectRef>
+            <a:fontRef idx="minor">
+              <a:schemeClr val="tx1"/>
+            </a:fontRef>
+          </p:style>
+        </p:cxnSp>
+      </p:grpSp>
+      <p:grpSp>
+        <p:nvGrpSpPr>
+          <p:cNvPr id="43" name="Group 42"/>
+          <p:cNvGrpSpPr/>
+          <p:nvPr/>
+        </p:nvGrpSpPr>
+        <p:grpSpPr>
+          <a:xfrm>
+            <a:off x="2394335" y="1024374"/>
+            <a:ext cx="1324575" cy="136546"/>
+            <a:chOff x="2075621" y="2223686"/>
+            <a:chExt cx="1324575" cy="136546"/>
+          </a:xfrm>
+        </p:grpSpPr>
+        <p:cxnSp>
+          <p:nvCxnSpPr>
+            <p:cNvPr id="44" name="Straight Arrow Connector 43"/>
+            <p:cNvCxnSpPr/>
+            <p:nvPr/>
+          </p:nvCxnSpPr>
+          <p:spPr>
+            <a:xfrm>
+              <a:off x="2075621" y="2360232"/>
+              <a:ext cx="832980" cy="0"/>
+            </a:xfrm>
+            <a:prstGeom prst="straightConnector1">
+              <a:avLst/>
+            </a:prstGeom>
+            <a:ln>
+              <a:solidFill>
+                <a:schemeClr val="accent4">
+                  <a:lumMod val="75000"/>
+                </a:schemeClr>
+              </a:solidFill>
+              <a:tailEnd type="arrow"/>
+            </a:ln>
+            <a:effectLst/>
+          </p:spPr>
+          <p:style>
+            <a:lnRef idx="2">
+              <a:schemeClr val="accent1"/>
+            </a:lnRef>
+            <a:fillRef idx="0">
+              <a:schemeClr val="accent1"/>
+            </a:fillRef>
+            <a:effectRef idx="1">
+              <a:schemeClr val="accent1"/>
+            </a:effectRef>
+            <a:fontRef idx="minor">
+              <a:schemeClr val="tx1"/>
+            </a:fontRef>
+          </p:style>
+        </p:cxnSp>
+        <p:cxnSp>
+          <p:nvCxnSpPr>
+            <p:cNvPr id="45" name="Straight Arrow Connector 44"/>
+            <p:cNvCxnSpPr/>
+            <p:nvPr/>
+          </p:nvCxnSpPr>
+          <p:spPr>
+            <a:xfrm flipH="1">
+              <a:off x="2621837" y="2223686"/>
+              <a:ext cx="778359" cy="0"/>
+            </a:xfrm>
+            <a:prstGeom prst="straightConnector1">
+              <a:avLst/>
+            </a:prstGeom>
+            <a:ln>
+              <a:solidFill>
+                <a:schemeClr val="accent4">
+                  <a:lumMod val="75000"/>
+                </a:schemeClr>
+              </a:solidFill>
+              <a:tailEnd type="arrow"/>
+            </a:ln>
+            <a:effectLst/>
+          </p:spPr>
+          <p:style>
+            <a:lnRef idx="2">
+              <a:schemeClr val="accent1"/>
+            </a:lnRef>
+            <a:fillRef idx="0">
+              <a:schemeClr val="accent1"/>
+            </a:fillRef>
+            <a:effectRef idx="1">
+              <a:schemeClr val="accent1"/>
+            </a:effectRef>
+            <a:fontRef idx="minor">
+              <a:schemeClr val="tx1"/>
+            </a:fontRef>
+          </p:style>
+        </p:cxnSp>
+      </p:grpSp>
+      <p:grpSp>
+        <p:nvGrpSpPr>
+          <p:cNvPr id="46" name="Group 45"/>
+          <p:cNvGrpSpPr/>
+          <p:nvPr/>
+        </p:nvGrpSpPr>
+        <p:grpSpPr>
+          <a:xfrm>
+            <a:off x="2546735" y="1310317"/>
+            <a:ext cx="1324575" cy="136546"/>
+            <a:chOff x="2075621" y="2223686"/>
+            <a:chExt cx="1324575" cy="136546"/>
+          </a:xfrm>
+        </p:grpSpPr>
+        <p:cxnSp>
+          <p:nvCxnSpPr>
+            <p:cNvPr id="47" name="Straight Arrow Connector 46"/>
+            <p:cNvCxnSpPr/>
+            <p:nvPr/>
+          </p:nvCxnSpPr>
+          <p:spPr>
+            <a:xfrm>
+              <a:off x="2075621" y="2360232"/>
+              <a:ext cx="832980" cy="0"/>
+            </a:xfrm>
+            <a:prstGeom prst="straightConnector1">
+              <a:avLst/>
+            </a:prstGeom>
+            <a:ln>
+              <a:solidFill>
+                <a:schemeClr val="accent4">
+                  <a:lumMod val="75000"/>
+                </a:schemeClr>
+              </a:solidFill>
+              <a:tailEnd type="arrow"/>
+            </a:ln>
+            <a:effectLst/>
+          </p:spPr>
+          <p:style>
+            <a:lnRef idx="2">
+              <a:schemeClr val="accent1"/>
+            </a:lnRef>
+            <a:fillRef idx="0">
+              <a:schemeClr val="accent1"/>
+            </a:fillRef>
+            <a:effectRef idx="1">
+              <a:schemeClr val="accent1"/>
+            </a:effectRef>
+            <a:fontRef idx="minor">
+              <a:schemeClr val="tx1"/>
+            </a:fontRef>
+          </p:style>
+        </p:cxnSp>
+        <p:cxnSp>
+          <p:nvCxnSpPr>
+            <p:cNvPr id="48" name="Straight Arrow Connector 47"/>
+            <p:cNvCxnSpPr/>
+            <p:nvPr/>
+          </p:nvCxnSpPr>
+          <p:spPr>
+            <a:xfrm flipH="1">
+              <a:off x="2621837" y="2223686"/>
+              <a:ext cx="778359" cy="0"/>
+            </a:xfrm>
+            <a:prstGeom prst="straightConnector1">
+              <a:avLst/>
+            </a:prstGeom>
+            <a:ln>
+              <a:solidFill>
+                <a:schemeClr val="accent4">
+                  <a:lumMod val="75000"/>
+                </a:schemeClr>
+              </a:solidFill>
+              <a:tailEnd type="arrow"/>
+            </a:ln>
+            <a:effectLst/>
+          </p:spPr>
+          <p:style>
+            <a:lnRef idx="2">
+              <a:schemeClr val="accent1"/>
+            </a:lnRef>
+            <a:fillRef idx="0">
+              <a:schemeClr val="accent1"/>
+            </a:fillRef>
+            <a:effectRef idx="1">
+              <a:schemeClr val="accent1"/>
+            </a:effectRef>
+            <a:fontRef idx="minor">
+              <a:schemeClr val="tx1"/>
+            </a:fontRef>
+          </p:style>
+        </p:cxnSp>
+      </p:grpSp>
+      <p:grpSp>
+        <p:nvGrpSpPr>
+          <p:cNvPr id="55" name="Group 54"/>
+          <p:cNvGrpSpPr/>
+          <p:nvPr/>
+        </p:nvGrpSpPr>
+        <p:grpSpPr>
+          <a:xfrm>
+            <a:off x="2990536" y="3742016"/>
+            <a:ext cx="1324575" cy="136546"/>
+            <a:chOff x="2075621" y="2223686"/>
+            <a:chExt cx="1324575" cy="136546"/>
+          </a:xfrm>
+        </p:grpSpPr>
+        <p:cxnSp>
+          <p:nvCxnSpPr>
+            <p:cNvPr id="56" name="Straight Arrow Connector 55"/>
+            <p:cNvCxnSpPr/>
+            <p:nvPr/>
+          </p:nvCxnSpPr>
+          <p:spPr>
+            <a:xfrm>
+              <a:off x="2075621" y="2360232"/>
+              <a:ext cx="832980" cy="0"/>
+            </a:xfrm>
+            <a:prstGeom prst="straightConnector1">
+              <a:avLst/>
+            </a:prstGeom>
+            <a:ln>
+              <a:solidFill>
+                <a:schemeClr val="accent2">
+                  <a:lumMod val="75000"/>
+                </a:schemeClr>
+              </a:solidFill>
+              <a:tailEnd type="arrow"/>
+            </a:ln>
+            <a:effectLst/>
+          </p:spPr>
+          <p:style>
+            <a:lnRef idx="2">
+              <a:schemeClr val="accent1"/>
+            </a:lnRef>
+            <a:fillRef idx="0">
+              <a:schemeClr val="accent1"/>
+            </a:fillRef>
+            <a:effectRef idx="1">
+              <a:schemeClr val="accent1"/>
+            </a:effectRef>
+            <a:fontRef idx="minor">
+              <a:schemeClr val="tx1"/>
+            </a:fontRef>
+          </p:style>
+        </p:cxnSp>
+        <p:cxnSp>
+          <p:nvCxnSpPr>
+            <p:cNvPr id="57" name="Straight Arrow Connector 56"/>
+            <p:cNvCxnSpPr/>
+            <p:nvPr/>
+          </p:nvCxnSpPr>
+          <p:spPr>
+            <a:xfrm flipH="1">
+              <a:off x="2621837" y="2223686"/>
+              <a:ext cx="778359" cy="0"/>
+            </a:xfrm>
+            <a:prstGeom prst="straightConnector1">
+              <a:avLst/>
+            </a:prstGeom>
+            <a:ln>
+              <a:solidFill>
+                <a:schemeClr val="accent2">
+                  <a:lumMod val="75000"/>
+                </a:schemeClr>
+              </a:solidFill>
+              <a:tailEnd type="arrow"/>
+            </a:ln>
+            <a:effectLst/>
+          </p:spPr>
+          <p:style>
+            <a:lnRef idx="2">
+              <a:schemeClr val="accent1"/>
+            </a:lnRef>
+            <a:fillRef idx="0">
+              <a:schemeClr val="accent1"/>
+            </a:fillRef>
+            <a:effectRef idx="1">
+              <a:schemeClr val="accent1"/>
+            </a:effectRef>
+            <a:fontRef idx="minor">
+              <a:schemeClr val="tx1"/>
+            </a:fontRef>
+          </p:style>
+        </p:cxnSp>
+      </p:grpSp>
+      <p:grpSp>
+        <p:nvGrpSpPr>
+          <p:cNvPr id="58" name="Group 57"/>
+          <p:cNvGrpSpPr/>
+          <p:nvPr/>
+        </p:nvGrpSpPr>
+        <p:grpSpPr>
+          <a:xfrm>
+            <a:off x="3106608" y="2943473"/>
+            <a:ext cx="1324575" cy="136546"/>
+            <a:chOff x="2075621" y="2223686"/>
+            <a:chExt cx="1324575" cy="136546"/>
+          </a:xfrm>
+        </p:grpSpPr>
+        <p:cxnSp>
+          <p:nvCxnSpPr>
+            <p:cNvPr id="59" name="Straight Arrow Connector 58"/>
+            <p:cNvCxnSpPr/>
+            <p:nvPr/>
+          </p:nvCxnSpPr>
+          <p:spPr>
+            <a:xfrm>
+              <a:off x="2075621" y="2360232"/>
+              <a:ext cx="832980" cy="0"/>
+            </a:xfrm>
+            <a:prstGeom prst="straightConnector1">
+              <a:avLst/>
+            </a:prstGeom>
+            <a:ln>
+              <a:solidFill>
+                <a:schemeClr val="accent2">
+                  <a:lumMod val="75000"/>
+                </a:schemeClr>
+              </a:solidFill>
+              <a:tailEnd type="arrow"/>
+            </a:ln>
+            <a:effectLst/>
+          </p:spPr>
+          <p:style>
+            <a:lnRef idx="2">
+              <a:schemeClr val="accent1"/>
+            </a:lnRef>
+            <a:fillRef idx="0">
+              <a:schemeClr val="accent1"/>
+            </a:fillRef>
+            <a:effectRef idx="1">
+              <a:schemeClr val="accent1"/>
+            </a:effectRef>
+            <a:fontRef idx="minor">
+              <a:schemeClr val="tx1"/>
+            </a:fontRef>
+          </p:style>
+        </p:cxnSp>
+        <p:cxnSp>
+          <p:nvCxnSpPr>
+            <p:cNvPr id="60" name="Straight Arrow Connector 59"/>
+            <p:cNvCxnSpPr/>
+            <p:nvPr/>
+          </p:nvCxnSpPr>
+          <p:spPr>
+            <a:xfrm flipH="1">
+              <a:off x="2621837" y="2223686"/>
+              <a:ext cx="778359" cy="0"/>
+            </a:xfrm>
+            <a:prstGeom prst="straightConnector1">
+              <a:avLst/>
+            </a:prstGeom>
+            <a:ln>
+              <a:solidFill>
+                <a:schemeClr val="accent2">
+                  <a:lumMod val="75000"/>
+                </a:schemeClr>
+              </a:solidFill>
+              <a:tailEnd type="arrow"/>
+            </a:ln>
+            <a:effectLst/>
+          </p:spPr>
+          <p:style>
+            <a:lnRef idx="2">
+              <a:schemeClr val="accent1"/>
+            </a:lnRef>
+            <a:fillRef idx="0">
+              <a:schemeClr val="accent1"/>
+            </a:fillRef>
+            <a:effectRef idx="1">
+              <a:schemeClr val="accent1"/>
+            </a:effectRef>
+            <a:fontRef idx="minor">
+              <a:schemeClr val="tx1"/>
+            </a:fontRef>
+          </p:style>
+        </p:cxnSp>
+      </p:grpSp>
+      <p:grpSp>
+        <p:nvGrpSpPr>
+          <p:cNvPr id="61" name="Group 60"/>
+          <p:cNvGrpSpPr/>
+          <p:nvPr/>
+        </p:nvGrpSpPr>
+        <p:grpSpPr>
+          <a:xfrm>
+            <a:off x="3259008" y="3439894"/>
+            <a:ext cx="1324575" cy="136546"/>
+            <a:chOff x="2075621" y="2223686"/>
+            <a:chExt cx="1324575" cy="136546"/>
+          </a:xfrm>
+        </p:grpSpPr>
+        <p:cxnSp>
+          <p:nvCxnSpPr>
+            <p:cNvPr id="62" name="Straight Arrow Connector 61"/>
+            <p:cNvCxnSpPr/>
+            <p:nvPr/>
+          </p:nvCxnSpPr>
+          <p:spPr>
+            <a:xfrm>
+              <a:off x="2075621" y="2360232"/>
+              <a:ext cx="832980" cy="0"/>
+            </a:xfrm>
+            <a:prstGeom prst="straightConnector1">
+              <a:avLst/>
+            </a:prstGeom>
+            <a:ln>
+              <a:solidFill>
+                <a:schemeClr val="accent2">
+                  <a:lumMod val="75000"/>
+                </a:schemeClr>
+              </a:solidFill>
+              <a:tailEnd type="arrow"/>
+            </a:ln>
+            <a:effectLst/>
+          </p:spPr>
+          <p:style>
+            <a:lnRef idx="2">
+              <a:schemeClr val="accent1"/>
+            </a:lnRef>
+            <a:fillRef idx="0">
+              <a:schemeClr val="accent1"/>
+            </a:fillRef>
+            <a:effectRef idx="1">
+              <a:schemeClr val="accent1"/>
+            </a:effectRef>
+            <a:fontRef idx="minor">
+              <a:schemeClr val="tx1"/>
+            </a:fontRef>
+          </p:style>
+        </p:cxnSp>
+        <p:cxnSp>
+          <p:nvCxnSpPr>
+            <p:cNvPr id="63" name="Straight Arrow Connector 62"/>
+            <p:cNvCxnSpPr/>
+            <p:nvPr/>
+          </p:nvCxnSpPr>
+          <p:spPr>
+            <a:xfrm flipH="1">
+              <a:off x="2621837" y="2223686"/>
+              <a:ext cx="778359" cy="0"/>
+            </a:xfrm>
+            <a:prstGeom prst="straightConnector1">
+              <a:avLst/>
+            </a:prstGeom>
+            <a:ln>
+              <a:solidFill>
+                <a:schemeClr val="accent2">
+                  <a:lumMod val="75000"/>
+                </a:schemeClr>
+              </a:solidFill>
+              <a:tailEnd type="arrow"/>
+            </a:ln>
+            <a:effectLst/>
+          </p:spPr>
+          <p:style>
+            <a:lnRef idx="2">
+              <a:schemeClr val="accent1"/>
+            </a:lnRef>
+            <a:fillRef idx="0">
+              <a:schemeClr val="accent1"/>
+            </a:fillRef>
+            <a:effectRef idx="1">
+              <a:schemeClr val="accent1"/>
+            </a:effectRef>
+            <a:fontRef idx="minor">
+              <a:schemeClr val="tx1"/>
+            </a:fontRef>
+          </p:style>
+        </p:cxnSp>
+      </p:grpSp>
+      <p:grpSp>
+        <p:nvGrpSpPr>
+          <p:cNvPr id="64" name="Group 63"/>
+          <p:cNvGrpSpPr/>
+          <p:nvPr/>
+        </p:nvGrpSpPr>
+        <p:grpSpPr>
+          <a:xfrm>
+            <a:off x="2990536" y="3287037"/>
+            <a:ext cx="1324575" cy="136546"/>
+            <a:chOff x="2075621" y="2223686"/>
+            <a:chExt cx="1324575" cy="136546"/>
+          </a:xfrm>
+        </p:grpSpPr>
+        <p:cxnSp>
+          <p:nvCxnSpPr>
+            <p:cNvPr id="65" name="Straight Arrow Connector 64"/>
+            <p:cNvCxnSpPr/>
+            <p:nvPr/>
+          </p:nvCxnSpPr>
+          <p:spPr>
+            <a:xfrm>
+              <a:off x="2075621" y="2360232"/>
+              <a:ext cx="832980" cy="0"/>
+            </a:xfrm>
+            <a:prstGeom prst="straightConnector1">
+              <a:avLst/>
+            </a:prstGeom>
+            <a:ln>
+              <a:solidFill>
+                <a:schemeClr val="accent2">
+                  <a:lumMod val="75000"/>
+                </a:schemeClr>
+              </a:solidFill>
+              <a:tailEnd type="arrow"/>
+            </a:ln>
+            <a:effectLst/>
+          </p:spPr>
+          <p:style>
+            <a:lnRef idx="2">
+              <a:schemeClr val="accent1"/>
+            </a:lnRef>
+            <a:fillRef idx="0">
+              <a:schemeClr val="accent1"/>
+            </a:fillRef>
+            <a:effectRef idx="1">
+              <a:schemeClr val="accent1"/>
+            </a:effectRef>
+            <a:fontRef idx="minor">
+              <a:schemeClr val="tx1"/>
+            </a:fontRef>
+          </p:style>
+        </p:cxnSp>
+        <p:cxnSp>
+          <p:nvCxnSpPr>
+            <p:cNvPr id="66" name="Straight Arrow Connector 65"/>
+            <p:cNvCxnSpPr/>
+            <p:nvPr/>
+          </p:nvCxnSpPr>
+          <p:spPr>
+            <a:xfrm flipH="1">
+              <a:off x="2621837" y="2223686"/>
+              <a:ext cx="778359" cy="0"/>
+            </a:xfrm>
+            <a:prstGeom prst="straightConnector1">
+              <a:avLst/>
+            </a:prstGeom>
+            <a:ln>
+              <a:solidFill>
+                <a:schemeClr val="accent2">
+                  <a:lumMod val="75000"/>
+                </a:schemeClr>
+              </a:solidFill>
+              <a:tailEnd type="arrow"/>
+            </a:ln>
+            <a:effectLst/>
+          </p:spPr>
+          <p:style>
+            <a:lnRef idx="2">
+              <a:schemeClr val="accent1"/>
+            </a:lnRef>
+            <a:fillRef idx="0">
+              <a:schemeClr val="accent1"/>
+            </a:fillRef>
+            <a:effectRef idx="1">
+              <a:schemeClr val="accent1"/>
+            </a:effectRef>
+            <a:fontRef idx="minor">
+              <a:schemeClr val="tx1"/>
+            </a:fontRef>
+          </p:style>
+        </p:cxnSp>
+      </p:grpSp>
+      <p:grpSp>
+        <p:nvGrpSpPr>
+          <p:cNvPr id="67" name="Group 66"/>
+          <p:cNvGrpSpPr/>
+          <p:nvPr/>
+        </p:nvGrpSpPr>
+        <p:grpSpPr>
+          <a:xfrm>
+            <a:off x="3259008" y="2613089"/>
+            <a:ext cx="1324575" cy="136546"/>
+            <a:chOff x="2075621" y="2223686"/>
+            <a:chExt cx="1324575" cy="136546"/>
+          </a:xfrm>
+        </p:grpSpPr>
+        <p:cxnSp>
+          <p:nvCxnSpPr>
+            <p:cNvPr id="68" name="Straight Arrow Connector 67"/>
+            <p:cNvCxnSpPr/>
+            <p:nvPr/>
+          </p:nvCxnSpPr>
+          <p:spPr>
+            <a:xfrm>
+              <a:off x="2075621" y="2360232"/>
+              <a:ext cx="832980" cy="0"/>
+            </a:xfrm>
+            <a:prstGeom prst="straightConnector1">
+              <a:avLst/>
+            </a:prstGeom>
+            <a:ln>
+              <a:solidFill>
+                <a:schemeClr val="accent2">
+                  <a:lumMod val="75000"/>
+                </a:schemeClr>
+              </a:solidFill>
+              <a:tailEnd type="arrow"/>
+            </a:ln>
+            <a:effectLst/>
+          </p:spPr>
+          <p:style>
+            <a:lnRef idx="2">
+              <a:schemeClr val="accent1"/>
+            </a:lnRef>
+            <a:fillRef idx="0">
+              <a:schemeClr val="accent1"/>
+            </a:fillRef>
+            <a:effectRef idx="1">
+              <a:schemeClr val="accent1"/>
+            </a:effectRef>
+            <a:fontRef idx="minor">
+              <a:schemeClr val="tx1"/>
+            </a:fontRef>
+          </p:style>
+        </p:cxnSp>
+        <p:cxnSp>
+          <p:nvCxnSpPr>
+            <p:cNvPr id="69" name="Straight Arrow Connector 68"/>
+            <p:cNvCxnSpPr/>
+            <p:nvPr/>
+          </p:nvCxnSpPr>
+          <p:spPr>
+            <a:xfrm flipH="1">
+              <a:off x="2621837" y="2223686"/>
+              <a:ext cx="778359" cy="0"/>
+            </a:xfrm>
+            <a:prstGeom prst="straightConnector1">
+              <a:avLst/>
+            </a:prstGeom>
+            <a:ln>
+              <a:solidFill>
+                <a:schemeClr val="accent2">
+                  <a:lumMod val="75000"/>
+                </a:schemeClr>
+              </a:solidFill>
+              <a:tailEnd type="arrow"/>
+            </a:ln>
+            <a:effectLst/>
+          </p:spPr>
+          <p:style>
+            <a:lnRef idx="2">
+              <a:schemeClr val="accent1"/>
+            </a:lnRef>
+            <a:fillRef idx="0">
+              <a:schemeClr val="accent1"/>
+            </a:fillRef>
+            <a:effectRef idx="1">
+              <a:schemeClr val="accent1"/>
+            </a:effectRef>
+            <a:fontRef idx="minor">
+              <a:schemeClr val="tx1"/>
+            </a:fontRef>
+          </p:style>
+        </p:cxnSp>
+      </p:grpSp>
+      <p:grpSp>
+        <p:nvGrpSpPr>
+          <p:cNvPr id="70" name="Group 69"/>
+          <p:cNvGrpSpPr/>
+          <p:nvPr/>
+        </p:nvGrpSpPr>
+        <p:grpSpPr>
+          <a:xfrm>
+            <a:off x="2886899" y="2374383"/>
+            <a:ext cx="1324575" cy="136546"/>
+            <a:chOff x="2075621" y="2223686"/>
+            <a:chExt cx="1324575" cy="136546"/>
+          </a:xfrm>
+        </p:grpSpPr>
+        <p:cxnSp>
+          <p:nvCxnSpPr>
+            <p:cNvPr id="71" name="Straight Arrow Connector 70"/>
+            <p:cNvCxnSpPr/>
+            <p:nvPr/>
+          </p:nvCxnSpPr>
+          <p:spPr>
+            <a:xfrm>
+              <a:off x="2075621" y="2360232"/>
+              <a:ext cx="832980" cy="0"/>
+            </a:xfrm>
+            <a:prstGeom prst="straightConnector1">
+              <a:avLst/>
+            </a:prstGeom>
+            <a:ln>
+              <a:solidFill>
+                <a:schemeClr val="accent2">
+                  <a:lumMod val="75000"/>
+                </a:schemeClr>
+              </a:solidFill>
+              <a:tailEnd type="arrow"/>
+            </a:ln>
+            <a:effectLst/>
+          </p:spPr>
+          <p:style>
+            <a:lnRef idx="2">
+              <a:schemeClr val="accent1"/>
+            </a:lnRef>
+            <a:fillRef idx="0">
+              <a:schemeClr val="accent1"/>
+            </a:fillRef>
+            <a:effectRef idx="1">
+              <a:schemeClr val="accent1"/>
+            </a:effectRef>
+            <a:fontRef idx="minor">
+              <a:schemeClr val="tx1"/>
+            </a:fontRef>
+          </p:style>
+        </p:cxnSp>
+        <p:cxnSp>
+          <p:nvCxnSpPr>
+            <p:cNvPr id="72" name="Straight Arrow Connector 71"/>
+            <p:cNvCxnSpPr/>
+            <p:nvPr/>
+          </p:nvCxnSpPr>
+          <p:spPr>
+            <a:xfrm flipH="1">
+              <a:off x="2621837" y="2223686"/>
+              <a:ext cx="778359" cy="0"/>
+            </a:xfrm>
+            <a:prstGeom prst="straightConnector1">
+              <a:avLst/>
+            </a:prstGeom>
+            <a:ln>
+              <a:solidFill>
+                <a:schemeClr val="accent2">
+                  <a:lumMod val="75000"/>
+                </a:schemeClr>
+              </a:solidFill>
+              <a:tailEnd type="arrow"/>
+            </a:ln>
+            <a:effectLst/>
+          </p:spPr>
+          <p:style>
+            <a:lnRef idx="2">
+              <a:schemeClr val="accent1"/>
+            </a:lnRef>
+            <a:fillRef idx="0">
+              <a:schemeClr val="accent1"/>
+            </a:fillRef>
+            <a:effectRef idx="1">
+              <a:schemeClr val="accent1"/>
+            </a:effectRef>
+            <a:fontRef idx="minor">
+              <a:schemeClr val="tx1"/>
+            </a:fontRef>
+          </p:style>
+        </p:cxnSp>
+      </p:grpSp>
+      <p:grpSp>
+        <p:nvGrpSpPr>
+          <p:cNvPr id="100" name="Group 99"/>
+          <p:cNvGrpSpPr/>
+          <p:nvPr/>
+        </p:nvGrpSpPr>
+        <p:grpSpPr>
+          <a:xfrm>
+            <a:off x="5313736" y="552070"/>
+            <a:ext cx="2705307" cy="3533468"/>
+            <a:chOff x="5428615" y="345094"/>
+            <a:chExt cx="3377675" cy="4411664"/>
+          </a:xfrm>
+        </p:grpSpPr>
+        <p:grpSp>
+          <p:nvGrpSpPr>
+            <p:cNvPr id="87" name="Group 86"/>
+            <p:cNvGrpSpPr/>
+            <p:nvPr/>
+          </p:nvGrpSpPr>
+          <p:grpSpPr>
+            <a:xfrm rot="3145585">
+              <a:off x="5501800" y="348190"/>
+              <a:ext cx="1092433" cy="1086242"/>
+              <a:chOff x="5653337" y="532063"/>
+              <a:chExt cx="1092433" cy="1086242"/>
+            </a:xfrm>
+          </p:grpSpPr>
+          <p:sp>
+            <p:nvSpPr>
+              <p:cNvPr id="74" name="Block Arc 73"/>
+              <p:cNvSpPr/>
+              <p:nvPr/>
+            </p:nvSpPr>
+            <p:spPr>
+              <a:xfrm>
+                <a:off x="5653337" y="532063"/>
+                <a:ext cx="1092433" cy="1086242"/>
+              </a:xfrm>
+              <a:prstGeom prst="blockArc">
+                <a:avLst>
+                  <a:gd name="adj1" fmla="val 10800000"/>
+                  <a:gd name="adj2" fmla="val 0"/>
+                  <a:gd name="adj3" fmla="val 7400"/>
+                </a:avLst>
+              </a:prstGeom>
+              <a:solidFill>
+                <a:schemeClr val="accent1">
+                  <a:lumMod val="40000"/>
+                  <a:lumOff val="60000"/>
+                </a:schemeClr>
+              </a:solidFill>
+              <a:ln>
+                <a:solidFill>
+                  <a:schemeClr val="accent1">
+                    <a:lumMod val="40000"/>
+                    <a:lumOff val="60000"/>
+                  </a:schemeClr>
+                </a:solidFill>
+              </a:ln>
+              <a:effectLst/>
+            </p:spPr>
+            <p:style>
+              <a:lnRef idx="1">
+                <a:schemeClr val="accent1"/>
+              </a:lnRef>
+              <a:fillRef idx="3">
+                <a:schemeClr val="accent1"/>
+              </a:fillRef>
+              <a:effectRef idx="2">
+                <a:schemeClr val="accent1"/>
+              </a:effectRef>
+              <a:fontRef idx="minor">
+                <a:schemeClr val="lt1"/>
+              </a:fontRef>
+            </p:style>
+            <p:txBody>
+              <a:bodyPr rtlCol="0" anchor="ctr"/>
+              <a:lstStyle/>
+              <a:p>
+                <a:pPr algn="ctr"/>
+                <a:endParaRPr lang="en-US">
+                  <a:solidFill>
+                    <a:schemeClr val="tx1"/>
+                  </a:solidFill>
+                </a:endParaRPr>
+              </a:p>
+            </p:txBody>
+          </p:sp>
+          <p:sp>
+            <p:nvSpPr>
+              <p:cNvPr id="75" name="Block Arc 74"/>
+              <p:cNvSpPr/>
+              <p:nvPr/>
+            </p:nvSpPr>
+            <p:spPr>
+              <a:xfrm rot="10800000">
+                <a:off x="5653337" y="532063"/>
+                <a:ext cx="1092433" cy="1086242"/>
+              </a:xfrm>
+              <a:prstGeom prst="blockArc">
+                <a:avLst>
+                  <a:gd name="adj1" fmla="val 10800000"/>
+                  <a:gd name="adj2" fmla="val 0"/>
+                  <a:gd name="adj3" fmla="val 7400"/>
+                </a:avLst>
+              </a:prstGeom>
+              <a:solidFill>
+                <a:schemeClr val="accent2">
+                  <a:lumMod val="75000"/>
+                </a:schemeClr>
+              </a:solidFill>
+              <a:ln>
+                <a:solidFill>
+                  <a:srgbClr val="953735"/>
+                </a:solidFill>
+              </a:ln>
+              <a:effectLst/>
+            </p:spPr>
+            <p:style>
+              <a:lnRef idx="1">
+                <a:schemeClr val="accent1"/>
+              </a:lnRef>
+              <a:fillRef idx="3">
+                <a:schemeClr val="accent1"/>
+              </a:fillRef>
+              <a:effectRef idx="2">
+                <a:schemeClr val="accent1"/>
+              </a:effectRef>
+              <a:fontRef idx="minor">
+                <a:schemeClr val="lt1"/>
+              </a:fontRef>
+            </p:style>
+            <p:txBody>
+              <a:bodyPr rtlCol="0" anchor="ctr"/>
+              <a:lstStyle/>
+              <a:p>
+                <a:pPr algn="ctr"/>
+                <a:endParaRPr lang="en-US">
+                  <a:solidFill>
+                    <a:schemeClr val="tx1"/>
+                  </a:solidFill>
+                </a:endParaRPr>
+              </a:p>
+            </p:txBody>
+          </p:sp>
+        </p:grpSp>
+        <p:grpSp>
+          <p:nvGrpSpPr>
+            <p:cNvPr id="86" name="Group 85"/>
+            <p:cNvGrpSpPr/>
+            <p:nvPr/>
+          </p:nvGrpSpPr>
+          <p:grpSpPr>
+            <a:xfrm rot="3252918">
+              <a:off x="6547186" y="1174159"/>
+              <a:ext cx="1092433" cy="1092433"/>
+              <a:chOff x="5805737" y="2940395"/>
+              <a:chExt cx="1092433" cy="1092433"/>
+            </a:xfrm>
+          </p:grpSpPr>
+          <p:sp>
+            <p:nvSpPr>
+              <p:cNvPr id="80" name="Block Arc 79"/>
+              <p:cNvSpPr/>
+              <p:nvPr/>
+            </p:nvSpPr>
+            <p:spPr>
+              <a:xfrm rot="7385833">
+                <a:off x="5805737" y="2943491"/>
+                <a:ext cx="1092433" cy="1086242"/>
+              </a:xfrm>
+              <a:prstGeom prst="blockArc">
+                <a:avLst>
+                  <a:gd name="adj1" fmla="val 10800000"/>
+                  <a:gd name="adj2" fmla="val 0"/>
+                  <a:gd name="adj3" fmla="val 7400"/>
+                </a:avLst>
+              </a:prstGeom>
+              <a:solidFill>
+                <a:srgbClr val="77933C"/>
+              </a:solidFill>
+              <a:ln>
+                <a:solidFill>
+                  <a:srgbClr val="77933C"/>
+                </a:solidFill>
+              </a:ln>
+              <a:effectLst/>
+            </p:spPr>
+            <p:style>
+              <a:lnRef idx="1">
+                <a:schemeClr val="accent1"/>
+              </a:lnRef>
+              <a:fillRef idx="3">
+                <a:schemeClr val="accent1"/>
+              </a:fillRef>
+              <a:effectRef idx="2">
+                <a:schemeClr val="accent1"/>
+              </a:effectRef>
+              <a:fontRef idx="minor">
+                <a:schemeClr val="lt1"/>
+              </a:fontRef>
+            </p:style>
+            <p:txBody>
+              <a:bodyPr rtlCol="0" anchor="ctr"/>
+              <a:lstStyle/>
+              <a:p>
+                <a:pPr algn="ctr"/>
+                <a:endParaRPr lang="en-US">
+                  <a:solidFill>
+                    <a:schemeClr val="tx1"/>
+                  </a:solidFill>
+                </a:endParaRPr>
+              </a:p>
+            </p:txBody>
+          </p:sp>
+          <p:sp>
+            <p:nvSpPr>
+              <p:cNvPr id="81" name="Block Arc 80"/>
+              <p:cNvSpPr/>
+              <p:nvPr/>
+            </p:nvSpPr>
+            <p:spPr>
+              <a:xfrm>
+                <a:off x="5805737" y="2943491"/>
+                <a:ext cx="1092433" cy="1086242"/>
+              </a:xfrm>
+              <a:prstGeom prst="blockArc">
+                <a:avLst>
+                  <a:gd name="adj1" fmla="val 10800000"/>
+                  <a:gd name="adj2" fmla="val 0"/>
+                  <a:gd name="adj3" fmla="val 7400"/>
+                </a:avLst>
+              </a:prstGeom>
+              <a:solidFill>
+                <a:schemeClr val="accent6">
+                  <a:lumMod val="75000"/>
+                </a:schemeClr>
+              </a:solidFill>
+              <a:ln>
+                <a:solidFill>
+                  <a:schemeClr val="accent6">
+                    <a:lumMod val="75000"/>
+                  </a:schemeClr>
+                </a:solidFill>
+              </a:ln>
+              <a:effectLst/>
+            </p:spPr>
+            <p:style>
+              <a:lnRef idx="1">
+                <a:schemeClr val="accent1"/>
+              </a:lnRef>
+              <a:fillRef idx="3">
+                <a:schemeClr val="accent1"/>
+              </a:fillRef>
+              <a:effectRef idx="2">
+                <a:schemeClr val="accent1"/>
+              </a:effectRef>
+              <a:fontRef idx="minor">
+                <a:schemeClr val="lt1"/>
+              </a:fontRef>
+            </p:style>
+            <p:txBody>
+              <a:bodyPr rtlCol="0" anchor="ctr"/>
+              <a:lstStyle/>
+              <a:p>
+                <a:pPr algn="ctr"/>
+                <a:endParaRPr lang="en-US">
+                  <a:solidFill>
+                    <a:schemeClr val="tx1"/>
+                  </a:solidFill>
+                </a:endParaRPr>
+              </a:p>
+            </p:txBody>
+          </p:sp>
+          <p:sp>
+            <p:nvSpPr>
+              <p:cNvPr id="79" name="Block Arc 78"/>
+              <p:cNvSpPr/>
+              <p:nvPr/>
+            </p:nvSpPr>
+            <p:spPr>
+              <a:xfrm rot="13559080">
+                <a:off x="5805737" y="2943491"/>
+                <a:ext cx="1092433" cy="1086242"/>
+              </a:xfrm>
+              <a:prstGeom prst="blockArc">
+                <a:avLst>
+                  <a:gd name="adj1" fmla="val 14369025"/>
+                  <a:gd name="adj2" fmla="val 0"/>
+                  <a:gd name="adj3" fmla="val 7400"/>
+                </a:avLst>
+              </a:prstGeom>
+              <a:solidFill>
+                <a:srgbClr val="604A7B"/>
+              </a:solidFill>
+              <a:ln>
+                <a:solidFill>
+                  <a:schemeClr val="accent4">
+                    <a:lumMod val="75000"/>
+                  </a:schemeClr>
+                </a:solidFill>
+              </a:ln>
+              <a:effectLst/>
+            </p:spPr>
+            <p:style>
+              <a:lnRef idx="1">
+                <a:schemeClr val="accent1"/>
+              </a:lnRef>
+              <a:fillRef idx="3">
+                <a:schemeClr val="accent1"/>
+              </a:fillRef>
+              <a:effectRef idx="2">
+                <a:schemeClr val="accent1"/>
+              </a:effectRef>
+              <a:fontRef idx="minor">
+                <a:schemeClr val="lt1"/>
+              </a:fontRef>
+            </p:style>
+            <p:txBody>
+              <a:bodyPr rtlCol="0" anchor="ctr"/>
+              <a:lstStyle/>
+              <a:p>
+                <a:pPr algn="ctr"/>
+                <a:endParaRPr lang="en-US">
+                  <a:solidFill>
+                    <a:schemeClr val="tx1"/>
+                  </a:solidFill>
+                </a:endParaRPr>
+              </a:p>
+            </p:txBody>
+          </p:sp>
+        </p:grpSp>
+        <p:grpSp>
+          <p:nvGrpSpPr>
+            <p:cNvPr id="85" name="Group 84"/>
+            <p:cNvGrpSpPr/>
+            <p:nvPr/>
+          </p:nvGrpSpPr>
+          <p:grpSpPr>
+            <a:xfrm rot="19116266">
+              <a:off x="5428615" y="1597238"/>
+              <a:ext cx="1092433" cy="1092433"/>
+              <a:chOff x="5958137" y="3092795"/>
+              <a:chExt cx="1092433" cy="1092433"/>
+            </a:xfrm>
+          </p:grpSpPr>
+          <p:sp>
+            <p:nvSpPr>
+              <p:cNvPr id="82" name="Block Arc 81"/>
+              <p:cNvSpPr/>
+              <p:nvPr/>
+            </p:nvSpPr>
+            <p:spPr>
+              <a:xfrm rot="7385833">
+                <a:off x="5958137" y="3095891"/>
+                <a:ext cx="1092433" cy="1086242"/>
+              </a:xfrm>
+              <a:prstGeom prst="blockArc">
+                <a:avLst>
+                  <a:gd name="adj1" fmla="val 10800000"/>
+                  <a:gd name="adj2" fmla="val 0"/>
+                  <a:gd name="adj3" fmla="val 7400"/>
+                </a:avLst>
+              </a:prstGeom>
+              <a:solidFill>
+                <a:srgbClr val="77933C"/>
+              </a:solidFill>
+              <a:ln>
+                <a:solidFill>
+                  <a:schemeClr val="accent3">
+                    <a:lumMod val="75000"/>
+                  </a:schemeClr>
+                </a:solidFill>
+              </a:ln>
+              <a:effectLst/>
+            </p:spPr>
+            <p:style>
+              <a:lnRef idx="1">
+                <a:schemeClr val="accent1"/>
+              </a:lnRef>
+              <a:fillRef idx="3">
+                <a:schemeClr val="accent1"/>
+              </a:fillRef>
+              <a:effectRef idx="2">
+                <a:schemeClr val="accent1"/>
+              </a:effectRef>
+              <a:fontRef idx="minor">
+                <a:schemeClr val="lt1"/>
+              </a:fontRef>
+            </p:style>
+            <p:txBody>
+              <a:bodyPr rtlCol="0" anchor="ctr"/>
+              <a:lstStyle/>
+              <a:p>
+                <a:pPr algn="ctr"/>
+                <a:endParaRPr lang="en-US">
+                  <a:solidFill>
+                    <a:schemeClr val="tx1"/>
+                  </a:solidFill>
+                </a:endParaRPr>
+              </a:p>
+            </p:txBody>
+          </p:sp>
+          <p:sp>
+            <p:nvSpPr>
+              <p:cNvPr id="83" name="Block Arc 82"/>
+              <p:cNvSpPr/>
+              <p:nvPr/>
+            </p:nvSpPr>
+            <p:spPr>
+              <a:xfrm>
+                <a:off x="5958137" y="3095891"/>
+                <a:ext cx="1092433" cy="1086242"/>
+              </a:xfrm>
+              <a:prstGeom prst="blockArc">
+                <a:avLst>
+                  <a:gd name="adj1" fmla="val 10800000"/>
+                  <a:gd name="adj2" fmla="val 0"/>
+                  <a:gd name="adj3" fmla="val 7400"/>
+                </a:avLst>
+              </a:prstGeom>
+              <a:solidFill>
+                <a:schemeClr val="accent6">
+                  <a:lumMod val="75000"/>
+                </a:schemeClr>
+              </a:solidFill>
+              <a:ln>
+                <a:solidFill>
+                  <a:schemeClr val="accent6">
+                    <a:lumMod val="75000"/>
+                  </a:schemeClr>
+                </a:solidFill>
+              </a:ln>
+              <a:effectLst/>
+            </p:spPr>
+            <p:style>
+              <a:lnRef idx="1">
+                <a:schemeClr val="accent1"/>
+              </a:lnRef>
+              <a:fillRef idx="3">
+                <a:schemeClr val="accent1"/>
+              </a:fillRef>
+              <a:effectRef idx="2">
+                <a:schemeClr val="accent1"/>
+              </a:effectRef>
+              <a:fontRef idx="minor">
+                <a:schemeClr val="lt1"/>
+              </a:fontRef>
+            </p:style>
+            <p:txBody>
+              <a:bodyPr rtlCol="0" anchor="ctr"/>
+              <a:lstStyle/>
+              <a:p>
+                <a:pPr algn="ctr"/>
+                <a:endParaRPr lang="en-US">
+                  <a:solidFill>
+                    <a:schemeClr val="tx1"/>
+                  </a:solidFill>
+                </a:endParaRPr>
+              </a:p>
+            </p:txBody>
+          </p:sp>
+          <p:sp>
+            <p:nvSpPr>
+              <p:cNvPr id="84" name="Block Arc 83"/>
+              <p:cNvSpPr/>
+              <p:nvPr/>
+            </p:nvSpPr>
+            <p:spPr>
+              <a:xfrm rot="13559080">
+                <a:off x="5958137" y="3095891"/>
+                <a:ext cx="1092433" cy="1086242"/>
+              </a:xfrm>
+              <a:prstGeom prst="blockArc">
+                <a:avLst>
+                  <a:gd name="adj1" fmla="val 14369025"/>
+                  <a:gd name="adj2" fmla="val 0"/>
+                  <a:gd name="adj3" fmla="val 7400"/>
+                </a:avLst>
+              </a:prstGeom>
+              <a:solidFill>
+                <a:schemeClr val="accent4">
+                  <a:lumMod val="75000"/>
+                </a:schemeClr>
+              </a:solidFill>
+              <a:ln>
+                <a:solidFill>
+                  <a:schemeClr val="accent4">
+                    <a:lumMod val="75000"/>
+                  </a:schemeClr>
+                </a:solidFill>
+              </a:ln>
+              <a:effectLst/>
+            </p:spPr>
+            <p:style>
+              <a:lnRef idx="1">
+                <a:schemeClr val="accent1"/>
+              </a:lnRef>
+              <a:fillRef idx="3">
+                <a:schemeClr val="accent1"/>
+              </a:fillRef>
+              <a:effectRef idx="2">
+                <a:schemeClr val="accent1"/>
+              </a:effectRef>
+              <a:fontRef idx="minor">
+                <a:schemeClr val="lt1"/>
+              </a:fontRef>
+            </p:style>
+            <p:txBody>
+              <a:bodyPr rtlCol="0" anchor="ctr"/>
+              <a:lstStyle/>
+              <a:p>
+                <a:pPr algn="ctr"/>
+                <a:endParaRPr lang="en-US">
+                  <a:solidFill>
+                    <a:schemeClr val="tx1"/>
+                  </a:solidFill>
+                </a:endParaRPr>
+              </a:p>
+            </p:txBody>
+          </p:sp>
+        </p:grpSp>
+        <p:grpSp>
+          <p:nvGrpSpPr>
+            <p:cNvPr id="88" name="Group 87"/>
+            <p:cNvGrpSpPr/>
+            <p:nvPr/>
+          </p:nvGrpSpPr>
+          <p:grpSpPr>
+            <a:xfrm rot="17888151">
+              <a:off x="5575626" y="2786313"/>
+              <a:ext cx="1092433" cy="1086242"/>
+              <a:chOff x="5653337" y="532063"/>
+              <a:chExt cx="1092433" cy="1086242"/>
+            </a:xfrm>
+          </p:grpSpPr>
+          <p:sp>
+            <p:nvSpPr>
+              <p:cNvPr id="89" name="Block Arc 88"/>
+              <p:cNvSpPr/>
+              <p:nvPr/>
+            </p:nvSpPr>
+            <p:spPr>
+              <a:xfrm>
+                <a:off x="5653337" y="532063"/>
+                <a:ext cx="1092433" cy="1086242"/>
+              </a:xfrm>
+              <a:prstGeom prst="blockArc">
+                <a:avLst>
+                  <a:gd name="adj1" fmla="val 10800000"/>
+                  <a:gd name="adj2" fmla="val 0"/>
+                  <a:gd name="adj3" fmla="val 7400"/>
+                </a:avLst>
+              </a:prstGeom>
+              <a:solidFill>
+                <a:schemeClr val="accent1">
+                  <a:lumMod val="40000"/>
+                  <a:lumOff val="60000"/>
+                </a:schemeClr>
+              </a:solidFill>
+              <a:ln>
+                <a:solidFill>
+                  <a:schemeClr val="accent1">
+                    <a:lumMod val="40000"/>
+                    <a:lumOff val="60000"/>
+                  </a:schemeClr>
+                </a:solidFill>
+              </a:ln>
+              <a:effectLst/>
+            </p:spPr>
+            <p:style>
+              <a:lnRef idx="1">
+                <a:schemeClr val="accent1"/>
+              </a:lnRef>
+              <a:fillRef idx="3">
+                <a:schemeClr val="accent1"/>
+              </a:fillRef>
+              <a:effectRef idx="2">
+                <a:schemeClr val="accent1"/>
+              </a:effectRef>
+              <a:fontRef idx="minor">
+                <a:schemeClr val="lt1"/>
+              </a:fontRef>
+            </p:style>
+            <p:txBody>
+              <a:bodyPr rtlCol="0" anchor="ctr"/>
+              <a:lstStyle/>
+              <a:p>
+                <a:pPr algn="ctr"/>
+                <a:endParaRPr lang="en-US">
+                  <a:solidFill>
+                    <a:schemeClr val="tx1"/>
+                  </a:solidFill>
+                </a:endParaRPr>
+              </a:p>
+            </p:txBody>
+          </p:sp>
+          <p:sp>
+            <p:nvSpPr>
+              <p:cNvPr id="90" name="Block Arc 89"/>
+              <p:cNvSpPr/>
+              <p:nvPr/>
+            </p:nvSpPr>
+            <p:spPr>
+              <a:xfrm rot="10800000">
+                <a:off x="5653337" y="532063"/>
+                <a:ext cx="1092433" cy="1086242"/>
+              </a:xfrm>
+              <a:prstGeom prst="blockArc">
+                <a:avLst>
+                  <a:gd name="adj1" fmla="val 10800000"/>
+                  <a:gd name="adj2" fmla="val 0"/>
+                  <a:gd name="adj3" fmla="val 7400"/>
+                </a:avLst>
+              </a:prstGeom>
+              <a:solidFill>
+                <a:schemeClr val="accent2">
+                  <a:lumMod val="75000"/>
+                </a:schemeClr>
+              </a:solidFill>
+              <a:ln>
+                <a:solidFill>
+                  <a:srgbClr val="953735"/>
+                </a:solidFill>
+              </a:ln>
+              <a:effectLst/>
+            </p:spPr>
+            <p:style>
+              <a:lnRef idx="1">
+                <a:schemeClr val="accent1"/>
+              </a:lnRef>
+              <a:fillRef idx="3">
+                <a:schemeClr val="accent1"/>
+              </a:fillRef>
+              <a:effectRef idx="2">
+                <a:schemeClr val="accent1"/>
+              </a:effectRef>
+              <a:fontRef idx="minor">
+                <a:schemeClr val="lt1"/>
+              </a:fontRef>
+            </p:style>
+            <p:txBody>
+              <a:bodyPr rtlCol="0" anchor="ctr"/>
+              <a:lstStyle/>
+              <a:p>
+                <a:pPr algn="ctr"/>
+                <a:endParaRPr lang="en-US">
+                  <a:solidFill>
+                    <a:schemeClr val="tx1"/>
+                  </a:solidFill>
+                </a:endParaRPr>
+              </a:p>
+            </p:txBody>
+          </p:sp>
+        </p:grpSp>
+        <p:grpSp>
+          <p:nvGrpSpPr>
+            <p:cNvPr id="91" name="Group 90"/>
+            <p:cNvGrpSpPr/>
+            <p:nvPr/>
+          </p:nvGrpSpPr>
+          <p:grpSpPr>
+            <a:xfrm rot="19816730">
+              <a:off x="7713857" y="1595817"/>
+              <a:ext cx="1092433" cy="1086242"/>
+              <a:chOff x="5653337" y="532063"/>
+              <a:chExt cx="1092433" cy="1086242"/>
+            </a:xfrm>
+          </p:grpSpPr>
+          <p:sp>
+            <p:nvSpPr>
+              <p:cNvPr id="92" name="Block Arc 91"/>
+              <p:cNvSpPr/>
+              <p:nvPr/>
+            </p:nvSpPr>
+            <p:spPr>
+              <a:xfrm>
+                <a:off x="5653337" y="532063"/>
+                <a:ext cx="1092433" cy="1086242"/>
+              </a:xfrm>
+              <a:prstGeom prst="blockArc">
+                <a:avLst>
+                  <a:gd name="adj1" fmla="val 10800000"/>
+                  <a:gd name="adj2" fmla="val 0"/>
+                  <a:gd name="adj3" fmla="val 7400"/>
+                </a:avLst>
+              </a:prstGeom>
+              <a:solidFill>
+                <a:schemeClr val="accent1">
+                  <a:lumMod val="40000"/>
+                  <a:lumOff val="60000"/>
+                </a:schemeClr>
+              </a:solidFill>
+              <a:ln>
+                <a:solidFill>
+                  <a:schemeClr val="accent1">
+                    <a:lumMod val="40000"/>
+                    <a:lumOff val="60000"/>
+                  </a:schemeClr>
+                </a:solidFill>
+              </a:ln>
+              <a:effectLst/>
+            </p:spPr>
+            <p:style>
+              <a:lnRef idx="1">
+                <a:schemeClr val="accent1"/>
+              </a:lnRef>
+              <a:fillRef idx="3">
+                <a:schemeClr val="accent1"/>
+              </a:fillRef>
+              <a:effectRef idx="2">
+                <a:schemeClr val="accent1"/>
+              </a:effectRef>
+              <a:fontRef idx="minor">
+                <a:schemeClr val="lt1"/>
+              </a:fontRef>
+            </p:style>
+            <p:txBody>
+              <a:bodyPr rtlCol="0" anchor="ctr"/>
+              <a:lstStyle/>
+              <a:p>
+                <a:pPr algn="ctr"/>
+                <a:endParaRPr lang="en-US">
+                  <a:solidFill>
+                    <a:schemeClr val="tx1"/>
+                  </a:solidFill>
+                </a:endParaRPr>
+              </a:p>
+            </p:txBody>
+          </p:sp>
+          <p:sp>
+            <p:nvSpPr>
+              <p:cNvPr id="93" name="Block Arc 92"/>
+              <p:cNvSpPr/>
+              <p:nvPr/>
+            </p:nvSpPr>
+            <p:spPr>
+              <a:xfrm rot="10800000">
+                <a:off x="5653337" y="532063"/>
+                <a:ext cx="1092433" cy="1086242"/>
+              </a:xfrm>
+              <a:prstGeom prst="blockArc">
+                <a:avLst>
+                  <a:gd name="adj1" fmla="val 10800000"/>
+                  <a:gd name="adj2" fmla="val 0"/>
+                  <a:gd name="adj3" fmla="val 7400"/>
+                </a:avLst>
+              </a:prstGeom>
+              <a:solidFill>
+                <a:schemeClr val="accent2">
+                  <a:lumMod val="75000"/>
+                </a:schemeClr>
+              </a:solidFill>
+              <a:ln>
+                <a:solidFill>
+                  <a:srgbClr val="953735"/>
+                </a:solidFill>
+              </a:ln>
+              <a:effectLst/>
+            </p:spPr>
+            <p:style>
+              <a:lnRef idx="1">
+                <a:schemeClr val="accent1"/>
+              </a:lnRef>
+              <a:fillRef idx="3">
+                <a:schemeClr val="accent1"/>
+              </a:fillRef>
+              <a:effectRef idx="2">
+                <a:schemeClr val="accent1"/>
+              </a:effectRef>
+              <a:fontRef idx="minor">
+                <a:schemeClr val="lt1"/>
+              </a:fontRef>
+            </p:style>
+            <p:txBody>
+              <a:bodyPr rtlCol="0" anchor="ctr"/>
+              <a:lstStyle/>
+              <a:p>
+                <a:pPr algn="ctr"/>
+                <a:endParaRPr lang="en-US">
+                  <a:solidFill>
+                    <a:schemeClr val="tx1"/>
+                  </a:solidFill>
+                </a:endParaRPr>
+              </a:p>
+            </p:txBody>
+          </p:sp>
+        </p:grpSp>
+        <p:grpSp>
+          <p:nvGrpSpPr>
+            <p:cNvPr id="94" name="Group 93"/>
+            <p:cNvGrpSpPr/>
+            <p:nvPr/>
+          </p:nvGrpSpPr>
+          <p:grpSpPr>
+            <a:xfrm rot="13113818">
+              <a:off x="6459720" y="3670516"/>
+              <a:ext cx="1092433" cy="1086242"/>
+              <a:chOff x="5653337" y="532063"/>
+              <a:chExt cx="1092433" cy="1086242"/>
+            </a:xfrm>
+          </p:grpSpPr>
+          <p:sp>
+            <p:nvSpPr>
+              <p:cNvPr id="95" name="Block Arc 94"/>
+              <p:cNvSpPr/>
+              <p:nvPr/>
+            </p:nvSpPr>
+            <p:spPr>
+              <a:xfrm>
+                <a:off x="5653337" y="532063"/>
+                <a:ext cx="1092433" cy="1086242"/>
+              </a:xfrm>
+              <a:prstGeom prst="blockArc">
+                <a:avLst>
+                  <a:gd name="adj1" fmla="val 10800000"/>
+                  <a:gd name="adj2" fmla="val 0"/>
+                  <a:gd name="adj3" fmla="val 7400"/>
+                </a:avLst>
+              </a:prstGeom>
+              <a:solidFill>
+                <a:schemeClr val="accent1">
+                  <a:lumMod val="40000"/>
+                  <a:lumOff val="60000"/>
+                </a:schemeClr>
+              </a:solidFill>
+              <a:ln>
+                <a:solidFill>
+                  <a:schemeClr val="accent1">
+                    <a:lumMod val="40000"/>
+                    <a:lumOff val="60000"/>
+                  </a:schemeClr>
+                </a:solidFill>
+              </a:ln>
+              <a:effectLst/>
+            </p:spPr>
+            <p:style>
+              <a:lnRef idx="1">
+                <a:schemeClr val="accent1"/>
+              </a:lnRef>
+              <a:fillRef idx="3">
+                <a:schemeClr val="accent1"/>
+              </a:fillRef>
+              <a:effectRef idx="2">
+                <a:schemeClr val="accent1"/>
+              </a:effectRef>
+              <a:fontRef idx="minor">
+                <a:schemeClr val="lt1"/>
+              </a:fontRef>
+            </p:style>
+            <p:txBody>
+              <a:bodyPr rtlCol="0" anchor="ctr"/>
+              <a:lstStyle/>
+              <a:p>
+                <a:pPr algn="ctr"/>
+                <a:endParaRPr lang="en-US">
+                  <a:solidFill>
+                    <a:schemeClr val="tx1"/>
+                  </a:solidFill>
+                </a:endParaRPr>
+              </a:p>
+            </p:txBody>
+          </p:sp>
+          <p:sp>
+            <p:nvSpPr>
+              <p:cNvPr id="96" name="Block Arc 95"/>
+              <p:cNvSpPr/>
+              <p:nvPr/>
+            </p:nvSpPr>
+            <p:spPr>
+              <a:xfrm rot="10800000">
+                <a:off x="5653337" y="532063"/>
+                <a:ext cx="1092433" cy="1086242"/>
+              </a:xfrm>
+              <a:prstGeom prst="blockArc">
+                <a:avLst>
+                  <a:gd name="adj1" fmla="val 10800000"/>
+                  <a:gd name="adj2" fmla="val 0"/>
+                  <a:gd name="adj3" fmla="val 7400"/>
+                </a:avLst>
+              </a:prstGeom>
+              <a:solidFill>
+                <a:schemeClr val="accent2">
+                  <a:lumMod val="75000"/>
+                </a:schemeClr>
+              </a:solidFill>
+              <a:ln>
+                <a:solidFill>
+                  <a:srgbClr val="953735"/>
+                </a:solidFill>
+              </a:ln>
+              <a:effectLst/>
+            </p:spPr>
+            <p:style>
+              <a:lnRef idx="1">
+                <a:schemeClr val="accent1"/>
+              </a:lnRef>
+              <a:fillRef idx="3">
+                <a:schemeClr val="accent1"/>
+              </a:fillRef>
+              <a:effectRef idx="2">
+                <a:schemeClr val="accent1"/>
+              </a:effectRef>
+              <a:fontRef idx="minor">
+                <a:schemeClr val="lt1"/>
+              </a:fontRef>
+            </p:style>
+            <p:txBody>
+              <a:bodyPr rtlCol="0" anchor="ctr"/>
+              <a:lstStyle/>
+              <a:p>
+                <a:pPr algn="ctr"/>
+                <a:endParaRPr lang="en-US">
+                  <a:solidFill>
+                    <a:schemeClr val="tx1"/>
+                  </a:solidFill>
+                </a:endParaRPr>
+              </a:p>
+            </p:txBody>
+          </p:sp>
+        </p:grpSp>
+        <p:grpSp>
+          <p:nvGrpSpPr>
+            <p:cNvPr id="97" name="Group 96"/>
+            <p:cNvGrpSpPr/>
+            <p:nvPr/>
+          </p:nvGrpSpPr>
+          <p:grpSpPr>
+            <a:xfrm rot="19970056">
+              <a:off x="6950324" y="2495383"/>
+              <a:ext cx="1092433" cy="1086242"/>
+              <a:chOff x="5653337" y="532063"/>
+              <a:chExt cx="1092433" cy="1086242"/>
+            </a:xfrm>
+          </p:grpSpPr>
+          <p:sp>
+            <p:nvSpPr>
+              <p:cNvPr id="98" name="Block Arc 97"/>
+              <p:cNvSpPr/>
+              <p:nvPr/>
+            </p:nvSpPr>
+            <p:spPr>
+              <a:xfrm>
+                <a:off x="5653337" y="532063"/>
+                <a:ext cx="1092433" cy="1086242"/>
+              </a:xfrm>
+              <a:prstGeom prst="blockArc">
+                <a:avLst>
+                  <a:gd name="adj1" fmla="val 10800000"/>
+                  <a:gd name="adj2" fmla="val 0"/>
+                  <a:gd name="adj3" fmla="val 7400"/>
+                </a:avLst>
+              </a:prstGeom>
+              <a:solidFill>
+                <a:schemeClr val="accent1">
+                  <a:lumMod val="40000"/>
+                  <a:lumOff val="60000"/>
+                </a:schemeClr>
+              </a:solidFill>
+              <a:ln>
+                <a:solidFill>
+                  <a:schemeClr val="accent1">
+                    <a:lumMod val="40000"/>
+                    <a:lumOff val="60000"/>
+                  </a:schemeClr>
+                </a:solidFill>
+              </a:ln>
+              <a:effectLst/>
+            </p:spPr>
+            <p:style>
+              <a:lnRef idx="1">
+                <a:schemeClr val="accent1"/>
+              </a:lnRef>
+              <a:fillRef idx="3">
+                <a:schemeClr val="accent1"/>
+              </a:fillRef>
+              <a:effectRef idx="2">
+                <a:schemeClr val="accent1"/>
+              </a:effectRef>
+              <a:fontRef idx="minor">
+                <a:schemeClr val="lt1"/>
+              </a:fontRef>
+            </p:style>
+            <p:txBody>
+              <a:bodyPr rtlCol="0" anchor="ctr"/>
+              <a:lstStyle/>
+              <a:p>
+                <a:pPr algn="ctr"/>
+                <a:endParaRPr lang="en-US">
+                  <a:solidFill>
+                    <a:schemeClr val="tx1"/>
+                  </a:solidFill>
+                </a:endParaRPr>
+              </a:p>
+            </p:txBody>
+          </p:sp>
+          <p:sp>
+            <p:nvSpPr>
+              <p:cNvPr id="99" name="Block Arc 98"/>
+              <p:cNvSpPr/>
+              <p:nvPr/>
+            </p:nvSpPr>
+            <p:spPr>
+              <a:xfrm rot="10800000">
+                <a:off x="5653337" y="532063"/>
+                <a:ext cx="1092433" cy="1086242"/>
+              </a:xfrm>
+              <a:prstGeom prst="blockArc">
+                <a:avLst>
+                  <a:gd name="adj1" fmla="val 10800000"/>
+                  <a:gd name="adj2" fmla="val 0"/>
+                  <a:gd name="adj3" fmla="val 7400"/>
+                </a:avLst>
+              </a:prstGeom>
+              <a:solidFill>
+                <a:schemeClr val="accent2">
+                  <a:lumMod val="75000"/>
+                </a:schemeClr>
+              </a:solidFill>
+              <a:ln>
+                <a:solidFill>
+                  <a:srgbClr val="953735"/>
+                </a:solidFill>
+              </a:ln>
+              <a:effectLst/>
+            </p:spPr>
+            <p:style>
+              <a:lnRef idx="1">
+                <a:schemeClr val="accent1"/>
+              </a:lnRef>
+              <a:fillRef idx="3">
+                <a:schemeClr val="accent1"/>
+              </a:fillRef>
+              <a:effectRef idx="2">
+                <a:schemeClr val="accent1"/>
+              </a:effectRef>
+              <a:fontRef idx="minor">
+                <a:schemeClr val="lt1"/>
+              </a:fontRef>
+            </p:style>
+            <p:txBody>
+              <a:bodyPr rtlCol="0" anchor="ctr"/>
+              <a:lstStyle/>
+              <a:p>
+                <a:pPr algn="ctr"/>
+                <a:endParaRPr lang="en-US">
+                  <a:solidFill>
+                    <a:schemeClr val="tx1"/>
+                  </a:solidFill>
+                </a:endParaRPr>
+              </a:p>
+            </p:txBody>
+          </p:sp>
+        </p:grpSp>
+      </p:grpSp>
+    </p:spTree>
+    <p:extLst>
+      <p:ext uri="{BB962C8B-B14F-4D97-AF65-F5344CB8AC3E}">
+        <p14:creationId xmlns:p14="http://schemas.microsoft.com/office/powerpoint/2010/main" val="263745251"/>
+      </p:ext>
+    </p:extLst>
+  </p:cSld>
+  <p:clrMapOvr>
+    <a:masterClrMapping/>
+  </p:clrMapOvr>
+</p:sld>
+</file>
+
+<file path=ppt/slides/slide7.xml><?xml version="1.0" encoding="utf-8"?>
+<p:sld xmlns:a="http://schemas.openxmlformats.org/drawingml/2006/main" xmlns:r="http://schemas.openxmlformats.org/officeDocument/2006/relationships" xmlns:p="http://schemas.openxmlformats.org/presentationml/2006/main">
+  <p:cSld>
+    <p:spTree>
+      <p:nvGrpSpPr>
+        <p:cNvPr id="1" name=""/>
+        <p:cNvGrpSpPr/>
+        <p:nvPr/>
+      </p:nvGrpSpPr>
+      <p:grpSpPr>
+        <a:xfrm>
+          <a:off x="0" y="0"/>
+          <a:ext cx="0" cy="0"/>
+          <a:chOff x="0" y="0"/>
+          <a:chExt cx="0" cy="0"/>
+        </a:xfrm>
+      </p:grpSpPr>
       <p:pic>
         <p:nvPicPr>
           <p:cNvPr id="4" name="Picture 3" descr="Screen Shot 2014-11-14 at 14.28.21.png"/>

</xml_diff>